<commit_message>
test message in presentation
</commit_message>
<xml_diff>
--- a/Presentation for Data Science 101.pptx
+++ b/Presentation for Data Science 101.pptx
@@ -117,6 +117,35 @@
     </p:ext>
   </p:extLst>
 </p:presentation>
+</file>
+
+<file path=ppt/changesInfos/changesInfo1.xml><?xml version="1.0" encoding="utf-8"?>
+<pc:chgInfo xmlns:a="http://schemas.openxmlformats.org/drawingml/2006/main" xmlns:r="http://schemas.openxmlformats.org/officeDocument/2006/relationships" xmlns:ac="http://schemas.microsoft.com/office/drawing/2013/main/command" xmlns:pc="http://schemas.microsoft.com/office/powerpoint/2013/main/command">
+  <pc:docChgLst>
+    <pc:chgData name="Nema Puthan" userId="8633c7f78c2ff340" providerId="LiveId" clId="{4DB9177E-1A48-474A-9CAF-4124783C27DA}"/>
+    <pc:docChg chg="custSel modSld">
+      <pc:chgData name="Nema Puthan" userId="8633c7f78c2ff340" providerId="LiveId" clId="{4DB9177E-1A48-474A-9CAF-4124783C27DA}" dt="2023-10-24T21:45:55.575" v="23" actId="20577"/>
+      <pc:docMkLst>
+        <pc:docMk/>
+      </pc:docMkLst>
+      <pc:sldChg chg="modSp mod">
+        <pc:chgData name="Nema Puthan" userId="8633c7f78c2ff340" providerId="LiveId" clId="{4DB9177E-1A48-474A-9CAF-4124783C27DA}" dt="2023-10-24T21:45:55.575" v="23" actId="20577"/>
+        <pc:sldMkLst>
+          <pc:docMk/>
+          <pc:sldMk cId="807467318" sldId="262"/>
+        </pc:sldMkLst>
+        <pc:spChg chg="mod">
+          <ac:chgData name="Nema Puthan" userId="8633c7f78c2ff340" providerId="LiveId" clId="{4DB9177E-1A48-474A-9CAF-4124783C27DA}" dt="2023-10-24T21:45:55.575" v="23" actId="20577"/>
+          <ac:spMkLst>
+            <pc:docMk/>
+            <pc:sldMk cId="807467318" sldId="262"/>
+            <ac:spMk id="6" creationId="{BBF26071-F77F-7993-F2B2-44F8B1219379}"/>
+          </ac:spMkLst>
+        </pc:spChg>
+      </pc:sldChg>
+    </pc:docChg>
+  </pc:docChgLst>
+</pc:chgInfo>
 </file>
 
 <file path=ppt/diagrams/colors1.xml><?xml version="1.0" encoding="utf-8"?>
@@ -1502,8 +1531,8 @@
   </dgm:ptLst>
   <dgm:cxnLst>
     <dgm:cxn modelId="{C9D32F31-5447-40AD-AAD2-EE2B13F7FDEE}" type="presOf" srcId="{085F711A-E98E-44D9-8916-1AAF7DEE1605}" destId="{B05D4E13-537B-423E-8BC9-19502FC11B24}" srcOrd="0" destOrd="0" presId="urn:microsoft.com/office/officeart/2018/2/layout/IconVerticalSolidList"/>
+    <dgm:cxn modelId="{71E08B5C-67F7-4A7B-BEB4-7C969FBACE54}" srcId="{A15AA906-191F-4549-8436-FEBEA94677CB}" destId="{9BF04D48-1CC6-4839-B8D1-95B4FA3524D9}" srcOrd="2" destOrd="0" parTransId="{1E1A71A2-066E-423E-ACA7-E558022CC34E}" sibTransId="{01144C6F-0F9D-4D43-BBA8-3220226F28E1}"/>
     <dgm:cxn modelId="{524E7647-98C3-42F1-BD5B-BA6318FF2019}" srcId="{A15AA906-191F-4549-8436-FEBEA94677CB}" destId="{085F711A-E98E-44D9-8916-1AAF7DEE1605}" srcOrd="1" destOrd="0" parTransId="{289A7E90-80B2-4526-BD64-37C430D0F225}" sibTransId="{71B19766-5D3C-4FB6-A972-87DD9A732667}"/>
-    <dgm:cxn modelId="{71E08B5C-67F7-4A7B-BEB4-7C969FBACE54}" srcId="{A15AA906-191F-4549-8436-FEBEA94677CB}" destId="{9BF04D48-1CC6-4839-B8D1-95B4FA3524D9}" srcOrd="2" destOrd="0" parTransId="{1E1A71A2-066E-423E-ACA7-E558022CC34E}" sibTransId="{01144C6F-0F9D-4D43-BBA8-3220226F28E1}"/>
     <dgm:cxn modelId="{547BFC72-BC89-4F28-A31A-CB48A1DA7062}" srcId="{A15AA906-191F-4549-8436-FEBEA94677CB}" destId="{96F870F9-2029-470B-A260-E7E879824B54}" srcOrd="3" destOrd="0" parTransId="{F2F672B7-6EA9-4676-B8C5-3831897BC4B8}" sibTransId="{90DFFEA5-DE81-444C-82F0-13906D034735}"/>
     <dgm:cxn modelId="{B8AEA07E-25E4-4B35-AA3D-A2E2DD3CAE7B}" type="presOf" srcId="{26E85509-46FC-432E-8583-625DACFDA84D}" destId="{3C6FEEC7-6332-4D9F-81F1-AF0D341C7A0D}" srcOrd="0" destOrd="0" presId="urn:microsoft.com/office/officeart/2018/2/layout/IconVerticalSolidList"/>
     <dgm:cxn modelId="{C1733B8D-AE8E-4754-94E6-BA3850D56A63}" type="presOf" srcId="{A15AA906-191F-4549-8436-FEBEA94677CB}" destId="{3E00E3F1-79A8-413D-BFDA-BA0C59D16F40}" srcOrd="0" destOrd="0" presId="urn:microsoft.com/office/officeart/2018/2/layout/IconVerticalSolidList"/>
@@ -4110,7 +4139,7 @@
           <a:p>
             <a:fld id="{F7AFFB9B-9FB8-469E-96F9-4D32314110B6}" type="datetimeFigureOut">
               <a:rPr lang="en-US" dirty="0"/>
-              <a:t>10/24/23</a:t>
+              <a:t>10/24/2023</a:t>
             </a:fld>
             <a:endParaRPr lang="en-US" dirty="0"/>
           </a:p>
@@ -4438,7 +4467,7 @@
           <a:p>
             <a:fld id="{341D2AC3-6A0B-4169-B1EA-E3AE8B351BDD}" type="datetimeFigureOut">
               <a:rPr lang="en-US" dirty="0"/>
-              <a:t>10/24/23</a:t>
+              <a:t>10/24/2023</a:t>
             </a:fld>
             <a:endParaRPr lang="en-US" dirty="0"/>
           </a:p>
@@ -4629,7 +4658,7 @@
           <a:p>
             <a:fld id="{DD4B9363-8B87-41B7-9F8E-64519CBB8F34}" type="datetimeFigureOut">
               <a:rPr lang="en-US" dirty="0"/>
-              <a:t>10/24/23</a:t>
+              <a:t>10/24/2023</a:t>
             </a:fld>
             <a:endParaRPr lang="en-US" dirty="0"/>
           </a:p>
@@ -4894,7 +4923,7 @@
           <a:p>
             <a:fld id="{EAEF5746-5284-4951-9F37-7AE924EDBCB7}" type="datetimeFigureOut">
               <a:rPr lang="en-US" dirty="0"/>
-              <a:t>10/24/23</a:t>
+              <a:t>10/24/2023</a:t>
             </a:fld>
             <a:endParaRPr lang="en-US" dirty="0"/>
           </a:p>
@@ -5317,7 +5346,7 @@
           <a:p>
             <a:fld id="{02398B29-7265-4A65-A2A4-6703C057B7C1}" type="datetimeFigureOut">
               <a:rPr lang="en-US" dirty="0"/>
-              <a:t>10/24/23</a:t>
+              <a:t>10/24/2023</a:t>
             </a:fld>
             <a:endParaRPr lang="en-US" dirty="0"/>
           </a:p>
@@ -5862,7 +5891,7 @@
           <a:p>
             <a:fld id="{28FBA082-94DF-4C4B-A041-6624924AB0A8}" type="datetimeFigureOut">
               <a:rPr lang="en-US" dirty="0"/>
-              <a:t>10/24/23</a:t>
+              <a:t>10/24/2023</a:t>
             </a:fld>
             <a:endParaRPr lang="en-US" dirty="0"/>
           </a:p>
@@ -6647,7 +6676,7 @@
           <a:p>
             <a:fld id="{B27686C4-3AB5-4E0C-86CA-FB108C350AA9}" type="datetimeFigureOut">
               <a:rPr lang="en-US" dirty="0"/>
-              <a:t>10/24/23</a:t>
+              <a:t>10/24/2023</a:t>
             </a:fld>
             <a:endParaRPr lang="en-US" dirty="0"/>
           </a:p>
@@ -6821,7 +6850,7 @@
           <a:p>
             <a:fld id="{49FF1211-4E0C-4AB3-B04F-585959BDAFE8}" type="datetimeFigureOut">
               <a:rPr lang="en-US" dirty="0"/>
-              <a:t>10/24/23</a:t>
+              <a:t>10/24/2023</a:t>
             </a:fld>
             <a:endParaRPr lang="en-US" dirty="0"/>
           </a:p>
@@ -7000,7 +7029,7 @@
           <a:p>
             <a:fld id="{28BDECAF-D3BE-4069-9C78-642ECCD01477}" type="datetimeFigureOut">
               <a:rPr lang="en-US" dirty="0"/>
-              <a:t>10/24/23</a:t>
+              <a:t>10/24/2023</a:t>
             </a:fld>
             <a:endParaRPr lang="en-US" dirty="0"/>
           </a:p>
@@ -7170,7 +7199,7 @@
           <a:p>
             <a:fld id="{8EFBDC27-E420-4878-9EE6-7B9656D6442A}" type="datetimeFigureOut">
               <a:rPr lang="en-US" dirty="0"/>
-              <a:t>10/24/23</a:t>
+              <a:t>10/24/2023</a:t>
             </a:fld>
             <a:endParaRPr lang="en-US" dirty="0"/>
           </a:p>
@@ -7415,7 +7444,7 @@
           <a:p>
             <a:fld id="{0F7F47CF-67C9-420C-80A5-E2069FF0C2DF}" type="datetimeFigureOut">
               <a:rPr lang="en-US" dirty="0"/>
-              <a:t>10/24/23</a:t>
+              <a:t>10/24/2023</a:t>
             </a:fld>
             <a:endParaRPr lang="en-US" dirty="0"/>
           </a:p>
@@ -7647,7 +7676,7 @@
           <a:p>
             <a:fld id="{AE22DC73-F065-42F5-A9F2-D90B2E42A0B3}" type="datetimeFigureOut">
               <a:rPr lang="en-US" dirty="0"/>
-              <a:t>10/24/23</a:t>
+              <a:t>10/24/2023</a:t>
             </a:fld>
             <a:endParaRPr lang="en-US" dirty="0"/>
           </a:p>
@@ -8027,7 +8056,7 @@
           <a:p>
             <a:fld id="{76BEA702-9B29-41CC-9BCC-3DF8A0D379FE}" type="datetimeFigureOut">
               <a:rPr lang="en-US" dirty="0"/>
-              <a:t>10/24/23</a:t>
+              <a:t>10/24/2023</a:t>
             </a:fld>
             <a:endParaRPr lang="en-US" dirty="0"/>
           </a:p>
@@ -8140,7 +8169,7 @@
           <a:p>
             <a:fld id="{097649AC-CB8F-4FF1-9A34-5861C74DD0A7}" type="datetimeFigureOut">
               <a:rPr lang="en-US" dirty="0"/>
-              <a:t>10/24/23</a:t>
+              <a:t>10/24/2023</a:t>
             </a:fld>
             <a:endParaRPr lang="en-US" dirty="0"/>
           </a:p>
@@ -8230,7 +8259,7 @@
           <a:p>
             <a:fld id="{3EC5CECA-2D3A-4680-9B49-752200DE467C}" type="datetimeFigureOut">
               <a:rPr lang="en-US" dirty="0"/>
-              <a:t>10/24/23</a:t>
+              <a:t>10/24/2023</a:t>
             </a:fld>
             <a:endParaRPr lang="en-US" dirty="0"/>
           </a:p>
@@ -8478,7 +8507,7 @@
           <a:p>
             <a:fld id="{50C3BFE2-83B7-4B0A-B9D3-AB28331082B3}" type="datetimeFigureOut">
               <a:rPr lang="en-US" dirty="0"/>
-              <a:t>10/24/23</a:t>
+              <a:t>10/24/2023</a:t>
             </a:fld>
             <a:endParaRPr lang="en-US" dirty="0"/>
           </a:p>
@@ -8742,7 +8771,7 @@
           <a:p>
             <a:fld id="{12EF78E3-FDA3-4D28-AAA2-0B81F349A39D}" type="datetimeFigureOut">
               <a:rPr lang="en-US" dirty="0"/>
-              <a:t>10/24/23</a:t>
+              <a:t>10/24/2023</a:t>
             </a:fld>
             <a:endParaRPr lang="en-US" dirty="0"/>
           </a:p>
@@ -9140,7 +9169,7 @@
           <a:p>
             <a:fld id="{C35BB1C6-BF8F-4481-8AB2-603A1C8A906A}" type="datetimeFigureOut">
               <a:rPr lang="en-US" dirty="0"/>
-              <a:t>10/24/23</a:t>
+              <a:t>10/24/2023</a:t>
             </a:fld>
             <a:endParaRPr lang="en-US" dirty="0"/>
           </a:p>
@@ -9801,6 +9830,13 @@
             <a:schemeClr val="tx1"/>
           </a:fontRef>
         </p:style>
+        <p:txBody>
+          <a:bodyPr/>
+          <a:lstStyle/>
+          <a:p>
+            <a:endParaRPr lang="en-US"/>
+          </a:p>
+        </p:txBody>
       </p:sp>
       <p:sp>
         <p:nvSpPr>
@@ -9981,6 +10017,13 @@
             <a:schemeClr val="lt1"/>
           </a:fontRef>
         </p:style>
+        <p:txBody>
+          <a:bodyPr/>
+          <a:lstStyle/>
+          <a:p>
+            <a:endParaRPr lang="en-US"/>
+          </a:p>
+        </p:txBody>
       </p:sp>
       <p:sp>
         <p:nvSpPr>
@@ -10047,6 +10090,13 @@
             <a:schemeClr val="lt1"/>
           </a:fontRef>
         </p:style>
+        <p:txBody>
+          <a:bodyPr/>
+          <a:lstStyle/>
+          <a:p>
+            <a:endParaRPr lang="en-US"/>
+          </a:p>
+        </p:txBody>
       </p:sp>
       <p:sp>
         <p:nvSpPr>
@@ -10466,6 +10516,13 @@
             <a:schemeClr val="lt1"/>
           </a:fontRef>
         </p:style>
+        <p:txBody>
+          <a:bodyPr/>
+          <a:lstStyle/>
+          <a:p>
+            <a:endParaRPr lang="en-US"/>
+          </a:p>
+        </p:txBody>
       </p:sp>
       <p:sp>
         <p:nvSpPr>
@@ -10574,7 +10631,7 @@
         <p:spPr>
           <a:xfrm>
             <a:off x="5800724" y="2803028"/>
-            <a:ext cx="3396853" cy="646331"/>
+            <a:ext cx="3396853" cy="923330"/>
           </a:xfrm>
           <a:prstGeom prst="rect">
             <a:avLst/>
@@ -10599,6 +10656,19 @@
               </a:rPr>
               <a:t>SMART question, lay out the plan of the presentation</a:t>
             </a:r>
+          </a:p>
+          <a:p>
+            <a:r>
+              <a:rPr lang="en-US">
+                <a:latin typeface="Calibri" panose="020F0502020204030204" pitchFamily="34" charset="0"/>
+                <a:cs typeface="Calibri" panose="020F0502020204030204" pitchFamily="34" charset="0"/>
+              </a:rPr>
+              <a:t>Test comment by Nema</a:t>
+            </a:r>
+            <a:endParaRPr lang="en-US" dirty="0">
+              <a:latin typeface="Calibri" panose="020F0502020204030204" pitchFamily="34" charset="0"/>
+              <a:cs typeface="Calibri" panose="020F0502020204030204" pitchFamily="34" charset="0"/>
+            </a:endParaRPr>
           </a:p>
         </p:txBody>
       </p:sp>
@@ -11489,6 +11559,13 @@
             <a:schemeClr val="lt1"/>
           </a:fontRef>
         </p:style>
+        <p:txBody>
+          <a:bodyPr/>
+          <a:lstStyle/>
+          <a:p>
+            <a:endParaRPr lang="en-US"/>
+          </a:p>
+        </p:txBody>
       </p:sp>
       <p:sp>
         <p:nvSpPr>
@@ -11712,6 +11789,13 @@
             <a:schemeClr val="lt1"/>
           </a:fontRef>
         </p:style>
+        <p:txBody>
+          <a:bodyPr/>
+          <a:lstStyle/>
+          <a:p>
+            <a:endParaRPr lang="en-US"/>
+          </a:p>
+        </p:txBody>
       </p:sp>
       <p:pic>
         <p:nvPicPr>
@@ -11824,6 +11908,13 @@
             <a:schemeClr val="tx1"/>
           </a:fontRef>
         </p:style>
+        <p:txBody>
+          <a:bodyPr/>
+          <a:lstStyle/>
+          <a:p>
+            <a:endParaRPr lang="en-US"/>
+          </a:p>
+        </p:txBody>
       </p:sp>
       <p:sp>
         <p:nvSpPr>
@@ -11888,6 +11979,13 @@
             <a:schemeClr val="lt1"/>
           </a:fontRef>
         </p:style>
+        <p:txBody>
+          <a:bodyPr/>
+          <a:lstStyle/>
+          <a:p>
+            <a:endParaRPr lang="en-US"/>
+          </a:p>
+        </p:txBody>
       </p:sp>
       <p:sp>
         <p:nvSpPr>
@@ -12228,6 +12326,13 @@
             <a:schemeClr val="lt1"/>
           </a:fontRef>
         </p:style>
+        <p:txBody>
+          <a:bodyPr/>
+          <a:lstStyle/>
+          <a:p>
+            <a:endParaRPr lang="en-US"/>
+          </a:p>
+        </p:txBody>
       </p:sp>
       <p:sp>
         <p:nvSpPr>
@@ -12318,6 +12423,13 @@
             <a:schemeClr val="lt1"/>
           </a:fontRef>
         </p:style>
+        <p:txBody>
+          <a:bodyPr/>
+          <a:lstStyle/>
+          <a:p>
+            <a:endParaRPr lang="en-US"/>
+          </a:p>
+        </p:txBody>
       </p:sp>
       <p:sp>
         <p:nvSpPr>
@@ -12405,6 +12517,13 @@
             <a:schemeClr val="lt1"/>
           </a:fontRef>
         </p:style>
+        <p:txBody>
+          <a:bodyPr/>
+          <a:lstStyle/>
+          <a:p>
+            <a:endParaRPr lang="en-US"/>
+          </a:p>
+        </p:txBody>
       </p:sp>
       <p:sp>
         <p:nvSpPr>
@@ -12480,6 +12599,13 @@
             <a:schemeClr val="tx1"/>
           </a:fontRef>
         </p:style>
+        <p:txBody>
+          <a:bodyPr/>
+          <a:lstStyle/>
+          <a:p>
+            <a:endParaRPr lang="en-US"/>
+          </a:p>
+        </p:txBody>
       </p:sp>
       <p:sp>
         <p:nvSpPr>
@@ -12539,6 +12665,13 @@
             <a:schemeClr val="lt1"/>
           </a:fontRef>
         </p:style>
+        <p:txBody>
+          <a:bodyPr/>
+          <a:lstStyle/>
+          <a:p>
+            <a:endParaRPr lang="en-US"/>
+          </a:p>
+        </p:txBody>
       </p:sp>
       <p:pic>
         <p:nvPicPr>
@@ -12726,6 +12859,13 @@
             <a:schemeClr val="tx1"/>
           </a:fontRef>
         </p:style>
+        <p:txBody>
+          <a:bodyPr/>
+          <a:lstStyle/>
+          <a:p>
+            <a:endParaRPr lang="en-US"/>
+          </a:p>
+        </p:txBody>
       </p:sp>
       <p:sp>
         <p:nvSpPr>
@@ -12835,6 +12975,13 @@
             <a:schemeClr val="lt1"/>
           </a:fontRef>
         </p:style>
+        <p:txBody>
+          <a:bodyPr/>
+          <a:lstStyle/>
+          <a:p>
+            <a:endParaRPr lang="en-US"/>
+          </a:p>
+        </p:txBody>
       </p:sp>
       <p:sp>
         <p:nvSpPr>
@@ -12901,6 +13048,13 @@
             <a:schemeClr val="lt1"/>
           </a:fontRef>
         </p:style>
+        <p:txBody>
+          <a:bodyPr/>
+          <a:lstStyle/>
+          <a:p>
+            <a:endParaRPr lang="en-US"/>
+          </a:p>
+        </p:txBody>
       </p:sp>
       <p:sp>
         <p:nvSpPr>

</xml_diff>

<commit_message>
Goals added to ppt
</commit_message>
<xml_diff>
--- a/Presentation for Data Science 101.pptx
+++ b/Presentation for Data Science 101.pptx
@@ -8,11 +8,15 @@
     <p:sldId id="256" r:id="rId2"/>
     <p:sldId id="262" r:id="rId3"/>
     <p:sldId id="258" r:id="rId4"/>
-    <p:sldId id="259" r:id="rId5"/>
-    <p:sldId id="267" r:id="rId6"/>
-    <p:sldId id="261" r:id="rId7"/>
-    <p:sldId id="264" r:id="rId8"/>
-    <p:sldId id="265" r:id="rId9"/>
+    <p:sldId id="271" r:id="rId5"/>
+    <p:sldId id="259" r:id="rId6"/>
+    <p:sldId id="268" r:id="rId7"/>
+    <p:sldId id="269" r:id="rId8"/>
+    <p:sldId id="270" r:id="rId9"/>
+    <p:sldId id="267" r:id="rId10"/>
+    <p:sldId id="261" r:id="rId11"/>
+    <p:sldId id="264" r:id="rId12"/>
+    <p:sldId id="265" r:id="rId13"/>
   </p:sldIdLst>
   <p:sldSz cx="12192000" cy="6858000"/>
   <p:notesSz cx="6858000" cy="9144000"/>
@@ -119,6 +123,14 @@
 </p:presentation>
 </file>
 
+<file path=ppt/revisionInfo.xml><?xml version="1.0" encoding="utf-8"?>
+<p1510:revInfo xmlns:a="http://schemas.openxmlformats.org/drawingml/2006/main" xmlns:r="http://schemas.openxmlformats.org/officeDocument/2006/relationships" xmlns:p1510="http://schemas.microsoft.com/office/powerpoint/2015/10/main">
+  <p1510:revLst>
+    <p1510:client id="{7E2F5E30-3ADF-4319-90D8-4D967DB4512E}" v="5" dt="2023-10-25T13:40:25.463"/>
+  </p1510:revLst>
+</p1510:revInfo>
+</file>
+
 <file path=ppt/changesInfos/changesInfo1.xml><?xml version="1.0" encoding="utf-8"?>
 <pc:chgInfo xmlns:a="http://schemas.openxmlformats.org/drawingml/2006/main" xmlns:r="http://schemas.openxmlformats.org/officeDocument/2006/relationships" xmlns:ac="http://schemas.microsoft.com/office/drawing/2013/main/command" xmlns:pc="http://schemas.microsoft.com/office/powerpoint/2013/main/command">
   <pc:docChgLst>
@@ -142,6 +154,193 @@
             <ac:spMk id="6" creationId="{BBF26071-F77F-7993-F2B2-44F8B1219379}"/>
           </ac:spMkLst>
         </pc:spChg>
+      </pc:sldChg>
+    </pc:docChg>
+  </pc:docChgLst>
+  <pc:docChgLst>
+    <pc:chgData name="Nema Puthan" userId="8633c7f78c2ff340" providerId="LiveId" clId="{7E2F5E30-3ADF-4319-90D8-4D967DB4512E}"/>
+    <pc:docChg chg="undo custSel addSld modSld">
+      <pc:chgData name="Nema Puthan" userId="8633c7f78c2ff340" providerId="LiveId" clId="{7E2F5E30-3ADF-4319-90D8-4D967DB4512E}" dt="2023-10-25T13:41:09.365" v="691" actId="1076"/>
+      <pc:docMkLst>
+        <pc:docMk/>
+      </pc:docMkLst>
+      <pc:sldChg chg="delSp modSp mod">
+        <pc:chgData name="Nema Puthan" userId="8633c7f78c2ff340" providerId="LiveId" clId="{7E2F5E30-3ADF-4319-90D8-4D967DB4512E}" dt="2023-10-25T13:40:49.383" v="685" actId="1076"/>
+        <pc:sldMkLst>
+          <pc:docMk/>
+          <pc:sldMk cId="866781982" sldId="259"/>
+        </pc:sldMkLst>
+        <pc:spChg chg="mod">
+          <ac:chgData name="Nema Puthan" userId="8633c7f78c2ff340" providerId="LiveId" clId="{7E2F5E30-3ADF-4319-90D8-4D967DB4512E}" dt="2023-10-25T13:37:46.782" v="636" actId="1076"/>
+          <ac:spMkLst>
+            <pc:docMk/>
+            <pc:sldMk cId="866781982" sldId="259"/>
+            <ac:spMk id="2" creationId="{0B0FA88E-F5CB-F94E-B3CC-A32DC675F506}"/>
+          </ac:spMkLst>
+        </pc:spChg>
+        <pc:spChg chg="mod">
+          <ac:chgData name="Nema Puthan" userId="8633c7f78c2ff340" providerId="LiveId" clId="{7E2F5E30-3ADF-4319-90D8-4D967DB4512E}" dt="2023-10-25T13:40:49.383" v="685" actId="1076"/>
+          <ac:spMkLst>
+            <pc:docMk/>
+            <pc:sldMk cId="866781982" sldId="259"/>
+            <ac:spMk id="3" creationId="{66E4F873-2D5F-D642-A6DA-AD596F9C7D00}"/>
+          </ac:spMkLst>
+        </pc:spChg>
+        <pc:picChg chg="del mod">
+          <ac:chgData name="Nema Puthan" userId="8633c7f78c2ff340" providerId="LiveId" clId="{7E2F5E30-3ADF-4319-90D8-4D967DB4512E}" dt="2023-10-25T13:40:45.494" v="684" actId="478"/>
+          <ac:picMkLst>
+            <pc:docMk/>
+            <pc:sldMk cId="866781982" sldId="259"/>
+            <ac:picMk id="9" creationId="{EB553CF8-7E2F-84C4-A9AA-8C06DEBF8C54}"/>
+          </ac:picMkLst>
+        </pc:picChg>
+      </pc:sldChg>
+      <pc:sldChg chg="modSp mod">
+        <pc:chgData name="Nema Puthan" userId="8633c7f78c2ff340" providerId="LiveId" clId="{7E2F5E30-3ADF-4319-90D8-4D967DB4512E}" dt="2023-10-25T13:34:32.935" v="630" actId="20577"/>
+        <pc:sldMkLst>
+          <pc:docMk/>
+          <pc:sldMk cId="807467318" sldId="262"/>
+        </pc:sldMkLst>
+        <pc:spChg chg="mod">
+          <ac:chgData name="Nema Puthan" userId="8633c7f78c2ff340" providerId="LiveId" clId="{7E2F5E30-3ADF-4319-90D8-4D967DB4512E}" dt="2023-10-25T13:26:16.760" v="322" actId="1076"/>
+          <ac:spMkLst>
+            <pc:docMk/>
+            <pc:sldMk cId="807467318" sldId="262"/>
+            <ac:spMk id="2" creationId="{0B712794-1D27-F940-92E6-56B4CDC32D7B}"/>
+          </ac:spMkLst>
+        </pc:spChg>
+        <pc:spChg chg="mod">
+          <ac:chgData name="Nema Puthan" userId="8633c7f78c2ff340" providerId="LiveId" clId="{7E2F5E30-3ADF-4319-90D8-4D967DB4512E}" dt="2023-10-25T13:34:32.935" v="630" actId="20577"/>
+          <ac:spMkLst>
+            <pc:docMk/>
+            <pc:sldMk cId="807467318" sldId="262"/>
+            <ac:spMk id="6" creationId="{BBF26071-F77F-7993-F2B2-44F8B1219379}"/>
+          </ac:spMkLst>
+        </pc:spChg>
+        <pc:picChg chg="mod">
+          <ac:chgData name="Nema Puthan" userId="8633c7f78c2ff340" providerId="LiveId" clId="{7E2F5E30-3ADF-4319-90D8-4D967DB4512E}" dt="2023-10-25T13:26:12.393" v="321" actId="1076"/>
+          <ac:picMkLst>
+            <pc:docMk/>
+            <pc:sldMk cId="807467318" sldId="262"/>
+            <ac:picMk id="5" creationId="{A334169D-180D-7F4A-BD62-D2029F111A97}"/>
+          </ac:picMkLst>
+        </pc:picChg>
+      </pc:sldChg>
+      <pc:sldChg chg="delSp modSp add mod setBg">
+        <pc:chgData name="Nema Puthan" userId="8633c7f78c2ff340" providerId="LiveId" clId="{7E2F5E30-3ADF-4319-90D8-4D967DB4512E}" dt="2023-10-25T13:40:55.022" v="687" actId="1076"/>
+        <pc:sldMkLst>
+          <pc:docMk/>
+          <pc:sldMk cId="2895819652" sldId="268"/>
+        </pc:sldMkLst>
+        <pc:spChg chg="mod">
+          <ac:chgData name="Nema Puthan" userId="8633c7f78c2ff340" providerId="LiveId" clId="{7E2F5E30-3ADF-4319-90D8-4D967DB4512E}" dt="2023-10-25T13:40:55.022" v="687" actId="1076"/>
+          <ac:spMkLst>
+            <pc:docMk/>
+            <pc:sldMk cId="2895819652" sldId="268"/>
+            <ac:spMk id="3" creationId="{66E4F873-2D5F-D642-A6DA-AD596F9C7D00}"/>
+          </ac:spMkLst>
+        </pc:spChg>
+        <pc:picChg chg="del">
+          <ac:chgData name="Nema Puthan" userId="8633c7f78c2ff340" providerId="LiveId" clId="{7E2F5E30-3ADF-4319-90D8-4D967DB4512E}" dt="2023-10-25T13:40:51.964" v="686" actId="478"/>
+          <ac:picMkLst>
+            <pc:docMk/>
+            <pc:sldMk cId="2895819652" sldId="268"/>
+            <ac:picMk id="9" creationId="{EB553CF8-7E2F-84C4-A9AA-8C06DEBF8C54}"/>
+          </ac:picMkLst>
+        </pc:picChg>
+      </pc:sldChg>
+      <pc:sldChg chg="delSp modSp add mod setBg">
+        <pc:chgData name="Nema Puthan" userId="8633c7f78c2ff340" providerId="LiveId" clId="{7E2F5E30-3ADF-4319-90D8-4D967DB4512E}" dt="2023-10-25T13:41:02.518" v="689" actId="1076"/>
+        <pc:sldMkLst>
+          <pc:docMk/>
+          <pc:sldMk cId="3148869259" sldId="269"/>
+        </pc:sldMkLst>
+        <pc:spChg chg="mod">
+          <ac:chgData name="Nema Puthan" userId="8633c7f78c2ff340" providerId="LiveId" clId="{7E2F5E30-3ADF-4319-90D8-4D967DB4512E}" dt="2023-10-25T13:41:02.518" v="689" actId="1076"/>
+          <ac:spMkLst>
+            <pc:docMk/>
+            <pc:sldMk cId="3148869259" sldId="269"/>
+            <ac:spMk id="3" creationId="{66E4F873-2D5F-D642-A6DA-AD596F9C7D00}"/>
+          </ac:spMkLst>
+        </pc:spChg>
+        <pc:picChg chg="del">
+          <ac:chgData name="Nema Puthan" userId="8633c7f78c2ff340" providerId="LiveId" clId="{7E2F5E30-3ADF-4319-90D8-4D967DB4512E}" dt="2023-10-25T13:40:58.188" v="688" actId="478"/>
+          <ac:picMkLst>
+            <pc:docMk/>
+            <pc:sldMk cId="3148869259" sldId="269"/>
+            <ac:picMk id="9" creationId="{EB553CF8-7E2F-84C4-A9AA-8C06DEBF8C54}"/>
+          </ac:picMkLst>
+        </pc:picChg>
+      </pc:sldChg>
+      <pc:sldChg chg="delSp modSp add mod setBg">
+        <pc:chgData name="Nema Puthan" userId="8633c7f78c2ff340" providerId="LiveId" clId="{7E2F5E30-3ADF-4319-90D8-4D967DB4512E}" dt="2023-10-25T13:41:09.365" v="691" actId="1076"/>
+        <pc:sldMkLst>
+          <pc:docMk/>
+          <pc:sldMk cId="156836234" sldId="270"/>
+        </pc:sldMkLst>
+        <pc:spChg chg="mod">
+          <ac:chgData name="Nema Puthan" userId="8633c7f78c2ff340" providerId="LiveId" clId="{7E2F5E30-3ADF-4319-90D8-4D967DB4512E}" dt="2023-10-25T13:41:09.365" v="691" actId="1076"/>
+          <ac:spMkLst>
+            <pc:docMk/>
+            <pc:sldMk cId="156836234" sldId="270"/>
+            <ac:spMk id="3" creationId="{66E4F873-2D5F-D642-A6DA-AD596F9C7D00}"/>
+          </ac:spMkLst>
+        </pc:spChg>
+        <pc:picChg chg="del">
+          <ac:chgData name="Nema Puthan" userId="8633c7f78c2ff340" providerId="LiveId" clId="{7E2F5E30-3ADF-4319-90D8-4D967DB4512E}" dt="2023-10-25T13:41:05.280" v="690" actId="478"/>
+          <ac:picMkLst>
+            <pc:docMk/>
+            <pc:sldMk cId="156836234" sldId="270"/>
+            <ac:picMk id="9" creationId="{EB553CF8-7E2F-84C4-A9AA-8C06DEBF8C54}"/>
+          </ac:picMkLst>
+        </pc:picChg>
+      </pc:sldChg>
+      <pc:sldChg chg="addSp delSp modSp add mod setBg">
+        <pc:chgData name="Nema Puthan" userId="8633c7f78c2ff340" providerId="LiveId" clId="{7E2F5E30-3ADF-4319-90D8-4D967DB4512E}" dt="2023-10-25T13:40:41.725" v="683" actId="1076"/>
+        <pc:sldMkLst>
+          <pc:docMk/>
+          <pc:sldMk cId="1598900383" sldId="271"/>
+        </pc:sldMkLst>
+        <pc:spChg chg="del">
+          <ac:chgData name="Nema Puthan" userId="8633c7f78c2ff340" providerId="LiveId" clId="{7E2F5E30-3ADF-4319-90D8-4D967DB4512E}" dt="2023-10-25T13:40:38.715" v="681" actId="478"/>
+          <ac:spMkLst>
+            <pc:docMk/>
+            <pc:sldMk cId="1598900383" sldId="271"/>
+            <ac:spMk id="2" creationId="{0B0FA88E-F5CB-F94E-B3CC-A32DC675F506}"/>
+          </ac:spMkLst>
+        </pc:spChg>
+        <pc:spChg chg="del">
+          <ac:chgData name="Nema Puthan" userId="8633c7f78c2ff340" providerId="LiveId" clId="{7E2F5E30-3ADF-4319-90D8-4D967DB4512E}" dt="2023-10-25T13:40:29.082" v="677" actId="478"/>
+          <ac:spMkLst>
+            <pc:docMk/>
+            <pc:sldMk cId="1598900383" sldId="271"/>
+            <ac:spMk id="3" creationId="{66E4F873-2D5F-D642-A6DA-AD596F9C7D00}"/>
+          </ac:spMkLst>
+        </pc:spChg>
+        <pc:spChg chg="add del mod">
+          <ac:chgData name="Nema Puthan" userId="8633c7f78c2ff340" providerId="LiveId" clId="{7E2F5E30-3ADF-4319-90D8-4D967DB4512E}" dt="2023-10-25T13:40:31.492" v="678" actId="478"/>
+          <ac:spMkLst>
+            <pc:docMk/>
+            <pc:sldMk cId="1598900383" sldId="271"/>
+            <ac:spMk id="5" creationId="{85909817-DE24-B7CB-40EA-F4FD858F516F}"/>
+          </ac:spMkLst>
+        </pc:spChg>
+        <pc:spChg chg="add del mod">
+          <ac:chgData name="Nema Puthan" userId="8633c7f78c2ff340" providerId="LiveId" clId="{7E2F5E30-3ADF-4319-90D8-4D967DB4512E}" dt="2023-10-25T13:40:40.498" v="682" actId="478"/>
+          <ac:spMkLst>
+            <pc:docMk/>
+            <pc:sldMk cId="1598900383" sldId="271"/>
+            <ac:spMk id="7" creationId="{BC14E8E8-C69E-2DBB-D48D-E1C9C894ADDE}"/>
+          </ac:spMkLst>
+        </pc:spChg>
+        <pc:picChg chg="mod">
+          <ac:chgData name="Nema Puthan" userId="8633c7f78c2ff340" providerId="LiveId" clId="{7E2F5E30-3ADF-4319-90D8-4D967DB4512E}" dt="2023-10-25T13:40:41.725" v="683" actId="1076"/>
+          <ac:picMkLst>
+            <pc:docMk/>
+            <pc:sldMk cId="1598900383" sldId="271"/>
+            <ac:picMk id="9" creationId="{EB553CF8-7E2F-84C4-A9AA-8C06DEBF8C54}"/>
+          </ac:picMkLst>
+        </pc:picChg>
       </pc:sldChg>
     </pc:docChg>
   </pc:docChgLst>
@@ -1221,10 +1420,10 @@
   <dgm:cxnLst>
     <dgm:cxn modelId="{C2E1E630-8F28-6D43-9AA5-FAF9A72DFBC2}" type="presOf" srcId="{FBD0A0A6-5AEA-4AA5-A9AD-587F212075A4}" destId="{6D5C2959-0D2F-A945-9FBB-C260C8F481BA}" srcOrd="0" destOrd="0" presId="urn:microsoft.com/office/officeart/2005/8/layout/vList2"/>
     <dgm:cxn modelId="{EEA0CB3A-8237-7C41-A204-18ECC37E7FD1}" type="presOf" srcId="{A15AA906-191F-4549-8436-FEBEA94677CB}" destId="{33B43129-3725-8748-BD5F-7758A7DE3FC4}" srcOrd="0" destOrd="0" presId="urn:microsoft.com/office/officeart/2005/8/layout/vList2"/>
+    <dgm:cxn modelId="{71E08B5C-67F7-4A7B-BEB4-7C969FBACE54}" srcId="{A15AA906-191F-4549-8436-FEBEA94677CB}" destId="{9BF04D48-1CC6-4839-B8D1-95B4FA3524D9}" srcOrd="2" destOrd="0" parTransId="{1E1A71A2-066E-423E-ACA7-E558022CC34E}" sibTransId="{01144C6F-0F9D-4D43-BBA8-3220226F28E1}"/>
     <dgm:cxn modelId="{524E7647-98C3-42F1-BD5B-BA6318FF2019}" srcId="{A15AA906-191F-4549-8436-FEBEA94677CB}" destId="{085F711A-E98E-44D9-8916-1AAF7DEE1605}" srcOrd="1" destOrd="0" parTransId="{289A7E90-80B2-4526-BD64-37C430D0F225}" sibTransId="{71B19766-5D3C-4FB6-A972-87DD9A732667}"/>
+    <dgm:cxn modelId="{547BFC72-BC89-4F28-A31A-CB48A1DA7062}" srcId="{A15AA906-191F-4549-8436-FEBEA94677CB}" destId="{96F870F9-2029-470B-A260-E7E879824B54}" srcOrd="3" destOrd="0" parTransId="{F2F672B7-6EA9-4676-B8C5-3831897BC4B8}" sibTransId="{90DFFEA5-DE81-444C-82F0-13906D034735}"/>
     <dgm:cxn modelId="{E7F93557-33E1-2C48-B8DD-EAE1CC17D569}" type="presOf" srcId="{96F870F9-2029-470B-A260-E7E879824B54}" destId="{447B64B8-4E27-514E-B6E2-516748A62724}" srcOrd="0" destOrd="0" presId="urn:microsoft.com/office/officeart/2005/8/layout/vList2"/>
-    <dgm:cxn modelId="{71E08B5C-67F7-4A7B-BEB4-7C969FBACE54}" srcId="{A15AA906-191F-4549-8436-FEBEA94677CB}" destId="{9BF04D48-1CC6-4839-B8D1-95B4FA3524D9}" srcOrd="2" destOrd="0" parTransId="{1E1A71A2-066E-423E-ACA7-E558022CC34E}" sibTransId="{01144C6F-0F9D-4D43-BBA8-3220226F28E1}"/>
-    <dgm:cxn modelId="{547BFC72-BC89-4F28-A31A-CB48A1DA7062}" srcId="{A15AA906-191F-4549-8436-FEBEA94677CB}" destId="{96F870F9-2029-470B-A260-E7E879824B54}" srcOrd="3" destOrd="0" parTransId="{F2F672B7-6EA9-4676-B8C5-3831897BC4B8}" sibTransId="{90DFFEA5-DE81-444C-82F0-13906D034735}"/>
     <dgm:cxn modelId="{1F577B9B-4F5A-471D-8038-926CAC768F7A}" srcId="{A15AA906-191F-4549-8436-FEBEA94677CB}" destId="{26E85509-46FC-432E-8583-625DACFDA84D}" srcOrd="0" destOrd="0" parTransId="{52583981-7684-4AA0-8B99-302D3102B31B}" sibTransId="{F7786CC6-578E-4E80-B3DC-1422747C4EBA}"/>
     <dgm:cxn modelId="{7BD15A9D-67F9-1D42-9591-0FC1BE5A589D}" type="presOf" srcId="{085F711A-E98E-44D9-8916-1AAF7DEE1605}" destId="{5DCC5A96-20E1-3941-8CAB-00D53CFF326A}" srcOrd="0" destOrd="0" presId="urn:microsoft.com/office/officeart/2005/8/layout/vList2"/>
     <dgm:cxn modelId="{8F311CF2-829F-664D-BD90-CD7F542B4945}" type="presOf" srcId="{26E85509-46FC-432E-8583-625DACFDA84D}" destId="{893ADDC2-4125-9A45-BD31-550DC5D1A057}" srcOrd="0" destOrd="0" presId="urn:microsoft.com/office/officeart/2005/8/layout/vList2"/>
@@ -3325,7 +3524,7 @@
           <a:p>
             <a:fld id="{F7AFFB9B-9FB8-469E-96F9-4D32314110B6}" type="datetimeFigureOut">
               <a:rPr lang="en-US" smtClean="0"/>
-              <a:t>10/24/23</a:t>
+              <a:t>10/25/2023</a:t>
             </a:fld>
             <a:endParaRPr lang="en-US" dirty="0"/>
           </a:p>
@@ -3663,7 +3862,7 @@
           <a:p>
             <a:fld id="{341D2AC3-6A0B-4169-B1EA-E3AE8B351BDD}" type="datetimeFigureOut">
               <a:rPr lang="en-US" smtClean="0"/>
-              <a:t>10/24/23</a:t>
+              <a:t>10/25/2023</a:t>
             </a:fld>
             <a:endParaRPr lang="en-US" dirty="0"/>
           </a:p>
@@ -3859,7 +4058,7 @@
           <a:p>
             <a:fld id="{DD4B9363-8B87-41B7-9F8E-64519CBB8F34}" type="datetimeFigureOut">
               <a:rPr lang="en-US" smtClean="0"/>
-              <a:t>10/24/23</a:t>
+              <a:t>10/25/2023</a:t>
             </a:fld>
             <a:endParaRPr lang="en-US" dirty="0"/>
           </a:p>
@@ -4129,7 +4328,7 @@
           <a:p>
             <a:fld id="{EAEF5746-5284-4951-9F37-7AE924EDBCB7}" type="datetimeFigureOut">
               <a:rPr lang="en-US" smtClean="0"/>
-              <a:t>10/24/23</a:t>
+              <a:t>10/25/2023</a:t>
             </a:fld>
             <a:endParaRPr lang="en-US" dirty="0"/>
           </a:p>
@@ -4557,7 +4756,7 @@
           <a:p>
             <a:fld id="{02398B29-7265-4A65-A2A4-6703C057B7C1}" type="datetimeFigureOut">
               <a:rPr lang="en-US" smtClean="0"/>
-              <a:t>10/24/23</a:t>
+              <a:t>10/25/2023</a:t>
             </a:fld>
             <a:endParaRPr lang="en-US" dirty="0"/>
           </a:p>
@@ -5107,7 +5306,7 @@
           <a:p>
             <a:fld id="{28FBA082-94DF-4C4B-A041-6624924AB0A8}" type="datetimeFigureOut">
               <a:rPr lang="en-US" smtClean="0"/>
-              <a:t>10/24/23</a:t>
+              <a:t>10/25/2023</a:t>
             </a:fld>
             <a:endParaRPr lang="en-US" dirty="0"/>
           </a:p>
@@ -5897,7 +6096,7 @@
           <a:p>
             <a:fld id="{B27686C4-3AB5-4E0C-86CA-FB108C350AA9}" type="datetimeFigureOut">
               <a:rPr lang="en-US" smtClean="0"/>
-              <a:t>10/24/23</a:t>
+              <a:t>10/25/2023</a:t>
             </a:fld>
             <a:endParaRPr lang="en-US" dirty="0"/>
           </a:p>
@@ -6076,7 +6275,7 @@
           <a:p>
             <a:fld id="{49FF1211-4E0C-4AB3-B04F-585959BDAFE8}" type="datetimeFigureOut">
               <a:rPr lang="en-US" smtClean="0"/>
-              <a:t>10/24/23</a:t>
+              <a:t>10/25/2023</a:t>
             </a:fld>
             <a:endParaRPr lang="en-US" dirty="0"/>
           </a:p>
@@ -6260,7 +6459,7 @@
           <a:p>
             <a:fld id="{28BDECAF-D3BE-4069-9C78-642ECCD01477}" type="datetimeFigureOut">
               <a:rPr lang="en-US" smtClean="0"/>
-              <a:t>10/24/23</a:t>
+              <a:t>10/25/2023</a:t>
             </a:fld>
             <a:endParaRPr lang="en-US" dirty="0"/>
           </a:p>
@@ -6435,7 +6634,7 @@
           <a:p>
             <a:fld id="{8EFBDC27-E420-4878-9EE6-7B9656D6442A}" type="datetimeFigureOut">
               <a:rPr lang="en-US" smtClean="0"/>
-              <a:t>10/24/23</a:t>
+              <a:t>10/25/2023</a:t>
             </a:fld>
             <a:endParaRPr lang="en-US" dirty="0"/>
           </a:p>
@@ -6685,7 +6884,7 @@
           <a:p>
             <a:fld id="{0F7F47CF-67C9-420C-80A5-E2069FF0C2DF}" type="datetimeFigureOut">
               <a:rPr lang="en-US" smtClean="0"/>
-              <a:t>10/24/23</a:t>
+              <a:t>10/25/2023</a:t>
             </a:fld>
             <a:endParaRPr lang="en-US" dirty="0"/>
           </a:p>
@@ -6922,7 +7121,7 @@
           <a:p>
             <a:fld id="{AE22DC73-F065-42F5-A9F2-D90B2E42A0B3}" type="datetimeFigureOut">
               <a:rPr lang="en-US" smtClean="0"/>
-              <a:t>10/24/23</a:t>
+              <a:t>10/25/2023</a:t>
             </a:fld>
             <a:endParaRPr lang="en-US" dirty="0"/>
           </a:p>
@@ -7307,7 +7506,7 @@
           <a:p>
             <a:fld id="{76BEA702-9B29-41CC-9BCC-3DF8A0D379FE}" type="datetimeFigureOut">
               <a:rPr lang="en-US" smtClean="0"/>
-              <a:t>10/24/23</a:t>
+              <a:t>10/25/2023</a:t>
             </a:fld>
             <a:endParaRPr lang="en-US" dirty="0"/>
           </a:p>
@@ -7425,7 +7624,7 @@
           <a:p>
             <a:fld id="{097649AC-CB8F-4FF1-9A34-5861C74DD0A7}" type="datetimeFigureOut">
               <a:rPr lang="en-US" smtClean="0"/>
-              <a:t>10/24/23</a:t>
+              <a:t>10/25/2023</a:t>
             </a:fld>
             <a:endParaRPr lang="en-US" dirty="0"/>
           </a:p>
@@ -7520,7 +7719,7 @@
           <a:p>
             <a:fld id="{3EC5CECA-2D3A-4680-9B49-752200DE467C}" type="datetimeFigureOut">
               <a:rPr lang="en-US" smtClean="0"/>
-              <a:t>10/24/23</a:t>
+              <a:t>10/25/2023</a:t>
             </a:fld>
             <a:endParaRPr lang="en-US" dirty="0"/>
           </a:p>
@@ -7773,7 +7972,7 @@
           <a:p>
             <a:fld id="{50C3BFE2-83B7-4B0A-B9D3-AB28331082B3}" type="datetimeFigureOut">
               <a:rPr lang="en-US" smtClean="0"/>
-              <a:t>10/24/23</a:t>
+              <a:t>10/25/2023</a:t>
             </a:fld>
             <a:endParaRPr lang="en-US" dirty="0"/>
           </a:p>
@@ -8042,7 +8241,7 @@
           <a:p>
             <a:fld id="{12EF78E3-FDA3-4D28-AAA2-0B81F349A39D}" type="datetimeFigureOut">
               <a:rPr lang="en-US" smtClean="0"/>
-              <a:t>10/24/23</a:t>
+              <a:t>10/25/2023</a:t>
             </a:fld>
             <a:endParaRPr lang="en-US" dirty="0"/>
           </a:p>
@@ -8446,7 +8645,7 @@
           <a:p>
             <a:fld id="{C35BB1C6-BF8F-4481-8AB2-603A1C8A906A}" type="datetimeFigureOut">
               <a:rPr lang="en-US" smtClean="0"/>
-              <a:t>10/24/23</a:t>
+              <a:t>10/25/2023</a:t>
             </a:fld>
             <a:endParaRPr lang="en-US" dirty="0"/>
           </a:p>
@@ -9298,6 +9497,852 @@
 </p:sld>
 </file>
 
+<file path=ppt/slides/slide10.xml><?xml version="1.0" encoding="utf-8"?>
+<p:sld xmlns:a="http://schemas.openxmlformats.org/drawingml/2006/main" xmlns:r="http://schemas.openxmlformats.org/officeDocument/2006/relationships" xmlns:p="http://schemas.openxmlformats.org/presentationml/2006/main">
+  <p:cSld>
+    <p:bg>
+      <p:bgPr>
+        <a:blipFill>
+          <a:blip r:embed="rId2">
+            <a:duotone>
+              <a:schemeClr val="bg1">
+                <a:shade val="48000"/>
+                <a:satMod val="110000"/>
+                <a:lumMod val="40000"/>
+              </a:schemeClr>
+              <a:schemeClr val="bg1">
+                <a:tint val="90000"/>
+                <a:lumMod val="106000"/>
+              </a:schemeClr>
+            </a:duotone>
+          </a:blip>
+          <a:stretch/>
+        </a:blipFill>
+        <a:effectLst/>
+      </p:bgPr>
+    </p:bg>
+    <p:spTree>
+      <p:nvGrpSpPr>
+        <p:cNvPr id="1" name=""/>
+        <p:cNvGrpSpPr/>
+        <p:nvPr/>
+      </p:nvGrpSpPr>
+      <p:grpSpPr>
+        <a:xfrm>
+          <a:off x="0" y="0"/>
+          <a:ext cx="0" cy="0"/>
+          <a:chOff x="0" y="0"/>
+          <a:chExt cx="0" cy="0"/>
+        </a:xfrm>
+      </p:grpSpPr>
+      <p:pic>
+        <p:nvPicPr>
+          <p:cNvPr id="10" name="Picture 9">
+            <a:extLst>
+              <a:ext uri="{FF2B5EF4-FFF2-40B4-BE49-F238E27FC236}">
+                <a16:creationId xmlns:a16="http://schemas.microsoft.com/office/drawing/2014/main" id="{05C90836-5ADB-4D63-A39D-D9BC0E10B492}"/>
+              </a:ext>
+              <a:ext uri="{C183D7F6-B498-43B3-948B-1728B52AA6E4}">
+                <adec:decorative xmlns:adec="http://schemas.microsoft.com/office/drawing/2017/decorative" val="1"/>
+              </a:ext>
+            </a:extLst>
+          </p:cNvPr>
+          <p:cNvPicPr>
+            <a:picLocks noGrp="1" noRot="1" noChangeAspect="1" noMove="1" noResize="1" noEditPoints="1" noAdjustHandles="1" noChangeArrowheads="1" noChangeShapeType="1" noCrop="1"/>
+          </p:cNvPicPr>
+          <p:nvPr>
+            <p:extLst>
+              <p:ext uri="{386F3935-93C4-4BCD-93E2-E3B085C9AB24}">
+                <p16:designElem xmlns:p16="http://schemas.microsoft.com/office/powerpoint/2015/main" val="1"/>
+              </p:ext>
+            </p:extLst>
+          </p:nvPr>
+        </p:nvPicPr>
+        <p:blipFill>
+          <a:blip r:embed="rId3">
+            <a:extLst>
+              <a:ext uri="{28A0092B-C50C-407E-A947-70E740481C1C}">
+                <a14:useLocalDpi xmlns:a14="http://schemas.microsoft.com/office/drawing/2010/main" val="0"/>
+              </a:ext>
+            </a:extLst>
+          </a:blip>
+          <a:stretch>
+            <a:fillRect/>
+          </a:stretch>
+        </p:blipFill>
+        <p:spPr>
+          <a:xfrm>
+            <a:off x="0" y="0"/>
+            <a:ext cx="12192000" cy="6858000"/>
+          </a:xfrm>
+          <a:prstGeom prst="rect">
+            <a:avLst/>
+          </a:prstGeom>
+        </p:spPr>
+      </p:pic>
+      <p:sp useBgFill="1">
+        <p:nvSpPr>
+          <p:cNvPr id="12" name="Rectangle 11">
+            <a:extLst>
+              <a:ext uri="{FF2B5EF4-FFF2-40B4-BE49-F238E27FC236}">
+                <a16:creationId xmlns:a16="http://schemas.microsoft.com/office/drawing/2014/main" id="{EC076BC1-44A9-43BA-9FA0-93D9F5636FA2}"/>
+              </a:ext>
+              <a:ext uri="{C183D7F6-B498-43B3-948B-1728B52AA6E4}">
+                <adec:decorative xmlns:adec="http://schemas.microsoft.com/office/drawing/2017/decorative" val="1"/>
+              </a:ext>
+            </a:extLst>
+          </p:cNvPr>
+          <p:cNvSpPr>
+            <a:spLocks noGrp="1" noRot="1" noChangeAspect="1" noMove="1" noResize="1" noEditPoints="1" noAdjustHandles="1" noChangeArrowheads="1" noChangeShapeType="1" noTextEdit="1"/>
+          </p:cNvSpPr>
+          <p:nvPr>
+            <p:extLst>
+              <p:ext uri="{386F3935-93C4-4BCD-93E2-E3B085C9AB24}">
+                <p16:designElem xmlns:p16="http://schemas.microsoft.com/office/powerpoint/2015/main" val="1"/>
+              </p:ext>
+            </p:extLst>
+          </p:nvPr>
+        </p:nvSpPr>
+        <p:spPr>
+          <a:xfrm>
+            <a:off x="1" y="0"/>
+            <a:ext cx="11979952" cy="6644081"/>
+          </a:xfrm>
+          <a:prstGeom prst="rect">
+            <a:avLst/>
+          </a:prstGeom>
+          <a:ln>
+            <a:noFill/>
+          </a:ln>
+          <a:effectLst>
+            <a:outerShdw blurRad="98425" dist="76200" dir="4380000" algn="tl" rotWithShape="0">
+              <a:srgbClr val="000000">
+                <a:alpha val="68000"/>
+              </a:srgbClr>
+            </a:outerShdw>
+          </a:effectLst>
+        </p:spPr>
+        <p:style>
+          <a:lnRef idx="1">
+            <a:schemeClr val="accent1"/>
+          </a:lnRef>
+          <a:fillRef idx="3">
+            <a:schemeClr val="accent1"/>
+          </a:fillRef>
+          <a:effectRef idx="2">
+            <a:schemeClr val="accent1"/>
+          </a:effectRef>
+          <a:fontRef idx="minor">
+            <a:schemeClr val="lt1"/>
+          </a:fontRef>
+        </p:style>
+        <p:txBody>
+          <a:bodyPr/>
+          <a:lstStyle/>
+          <a:p>
+            <a:endParaRPr lang="en-US"/>
+          </a:p>
+        </p:txBody>
+      </p:sp>
+      <p:sp>
+        <p:nvSpPr>
+          <p:cNvPr id="14" name="Freeform 9">
+            <a:extLst>
+              <a:ext uri="{FF2B5EF4-FFF2-40B4-BE49-F238E27FC236}">
+                <a16:creationId xmlns:a16="http://schemas.microsoft.com/office/drawing/2014/main" id="{10EBC408-9E16-4483-93FA-BB4E0D06D0C3}"/>
+              </a:ext>
+              <a:ext uri="{C183D7F6-B498-43B3-948B-1728B52AA6E4}">
+                <adec:decorative xmlns:adec="http://schemas.microsoft.com/office/drawing/2017/decorative" val="1"/>
+              </a:ext>
+            </a:extLst>
+          </p:cNvPr>
+          <p:cNvSpPr>
+            <a:spLocks noGrp="1" noRot="1" noChangeAspect="1" noMove="1" noResize="1" noEditPoints="1" noAdjustHandles="1" noChangeArrowheads="1" noChangeShapeType="1" noTextEdit="1"/>
+          </p:cNvSpPr>
+          <p:nvPr>
+            <p:extLst>
+              <p:ext uri="{386F3935-93C4-4BCD-93E2-E3B085C9AB24}">
+                <p16:designElem xmlns:p16="http://schemas.microsoft.com/office/powerpoint/2015/main" val="1"/>
+              </p:ext>
+            </p:extLst>
+          </p:nvPr>
+        </p:nvSpPr>
+        <p:spPr>
+          <a:xfrm>
+            <a:off x="-25397" y="0"/>
+            <a:ext cx="11773291" cy="6419514"/>
+          </a:xfrm>
+          <a:custGeom>
+            <a:avLst/>
+            <a:gdLst/>
+            <a:ahLst/>
+            <a:cxnLst/>
+            <a:rect l="l" t="t" r="r" b="b"/>
+            <a:pathLst>
+              <a:path w="11773291" h="6419514">
+                <a:moveTo>
+                  <a:pt x="11750059" y="0"/>
+                </a:moveTo>
+                <a:lnTo>
+                  <a:pt x="11773291" y="6419514"/>
+                </a:lnTo>
+                <a:lnTo>
+                  <a:pt x="0" y="6411047"/>
+                </a:lnTo>
+              </a:path>
+            </a:pathLst>
+          </a:custGeom>
+          <a:ln w="82550">
+            <a:solidFill>
+              <a:schemeClr val="tx1">
+                <a:lumMod val="50000"/>
+                <a:lumOff val="50000"/>
+              </a:schemeClr>
+            </a:solidFill>
+            <a:miter lim="800000"/>
+          </a:ln>
+        </p:spPr>
+        <p:style>
+          <a:lnRef idx="2">
+            <a:schemeClr val="accent1"/>
+          </a:lnRef>
+          <a:fillRef idx="0">
+            <a:schemeClr val="accent1"/>
+          </a:fillRef>
+          <a:effectRef idx="1">
+            <a:schemeClr val="accent1"/>
+          </a:effectRef>
+          <a:fontRef idx="minor">
+            <a:schemeClr val="tx1"/>
+          </a:fontRef>
+        </p:style>
+        <p:txBody>
+          <a:bodyPr/>
+          <a:lstStyle/>
+          <a:p>
+            <a:endParaRPr lang="en-US"/>
+          </a:p>
+        </p:txBody>
+      </p:sp>
+      <p:sp>
+        <p:nvSpPr>
+          <p:cNvPr id="16" name="Rectangle 15">
+            <a:extLst>
+              <a:ext uri="{FF2B5EF4-FFF2-40B4-BE49-F238E27FC236}">
+                <a16:creationId xmlns:a16="http://schemas.microsoft.com/office/drawing/2014/main" id="{1DAA8918-7760-46BA-B19F-9818085CB710}"/>
+              </a:ext>
+              <a:ext uri="{C183D7F6-B498-43B3-948B-1728B52AA6E4}">
+                <adec:decorative xmlns:adec="http://schemas.microsoft.com/office/drawing/2017/decorative" val="1"/>
+              </a:ext>
+            </a:extLst>
+          </p:cNvPr>
+          <p:cNvSpPr>
+            <a:spLocks noGrp="1" noRot="1" noChangeAspect="1" noMove="1" noResize="1" noEditPoints="1" noAdjustHandles="1" noChangeArrowheads="1" noChangeShapeType="1" noTextEdit="1"/>
+          </p:cNvSpPr>
+          <p:nvPr>
+            <p:extLst>
+              <p:ext uri="{386F3935-93C4-4BCD-93E2-E3B085C9AB24}">
+                <p16:designElem xmlns:p16="http://schemas.microsoft.com/office/powerpoint/2015/main" val="1"/>
+              </p:ext>
+            </p:extLst>
+          </p:nvPr>
+        </p:nvSpPr>
+        <p:spPr bwMode="white">
+          <a:xfrm>
+            <a:off x="0" y="0"/>
+            <a:ext cx="4654296" cy="6380796"/>
+          </a:xfrm>
+          <a:prstGeom prst="rect">
+            <a:avLst/>
+          </a:prstGeom>
+          <a:gradFill flip="none" rotWithShape="1">
+            <a:gsLst>
+              <a:gs pos="34000">
+                <a:schemeClr val="accent1"/>
+              </a:gs>
+              <a:gs pos="100000">
+                <a:schemeClr val="accent1">
+                  <a:lumMod val="50000"/>
+                </a:schemeClr>
+              </a:gs>
+            </a:gsLst>
+            <a:path path="circle">
+              <a:fillToRect l="50000" t="50000" r="50000" b="50000"/>
+            </a:path>
+            <a:tileRect/>
+          </a:gradFill>
+          <a:ln>
+            <a:noFill/>
+          </a:ln>
+        </p:spPr>
+        <p:style>
+          <a:lnRef idx="1">
+            <a:schemeClr val="accent1"/>
+          </a:lnRef>
+          <a:fillRef idx="3">
+            <a:schemeClr val="accent1"/>
+          </a:fillRef>
+          <a:effectRef idx="2">
+            <a:schemeClr val="accent1"/>
+          </a:effectRef>
+          <a:fontRef idx="minor">
+            <a:schemeClr val="lt1"/>
+          </a:fontRef>
+        </p:style>
+        <p:txBody>
+          <a:bodyPr/>
+          <a:lstStyle/>
+          <a:p>
+            <a:endParaRPr lang="en-US"/>
+          </a:p>
+        </p:txBody>
+      </p:sp>
+      <p:sp>
+        <p:nvSpPr>
+          <p:cNvPr id="2" name="Title 1">
+            <a:extLst>
+              <a:ext uri="{FF2B5EF4-FFF2-40B4-BE49-F238E27FC236}">
+                <a16:creationId xmlns:a16="http://schemas.microsoft.com/office/drawing/2014/main" id="{F01011D5-E803-D04A-9BAA-B1D023907CD1}"/>
+              </a:ext>
+            </a:extLst>
+          </p:cNvPr>
+          <p:cNvSpPr>
+            <a:spLocks noGrp="1"/>
+          </p:cNvSpPr>
+          <p:nvPr>
+            <p:ph type="title"/>
+          </p:nvPr>
+        </p:nvSpPr>
+        <p:spPr>
+          <a:xfrm>
+            <a:off x="685802" y="685800"/>
+            <a:ext cx="3381946" cy="4846967"/>
+          </a:xfrm>
+        </p:spPr>
+        <p:txBody>
+          <a:bodyPr>
+            <a:normAutofit/>
+          </a:bodyPr>
+          <a:lstStyle/>
+          <a:p>
+            <a:r>
+              <a:rPr lang="en-US" sz="4800" dirty="0">
+                <a:solidFill>
+                  <a:srgbClr val="FFFFFF"/>
+                </a:solidFill>
+              </a:rPr>
+              <a:t>LIMITATIONS</a:t>
+            </a:r>
+          </a:p>
+        </p:txBody>
+      </p:sp>
+      <p:graphicFrame>
+        <p:nvGraphicFramePr>
+          <p:cNvPr id="5" name="Content Placeholder 2">
+            <a:extLst>
+              <a:ext uri="{FF2B5EF4-FFF2-40B4-BE49-F238E27FC236}">
+                <a16:creationId xmlns:a16="http://schemas.microsoft.com/office/drawing/2014/main" id="{9A678997-6CE2-4427-A928-E779FE07A1DC}"/>
+              </a:ext>
+            </a:extLst>
+          </p:cNvPr>
+          <p:cNvGraphicFramePr>
+            <a:graphicFrameLocks noGrp="1"/>
+          </p:cNvGraphicFramePr>
+          <p:nvPr>
+            <p:ph sz="quarter" idx="13"/>
+            <p:extLst>
+              <p:ext uri="{D42A27DB-BD31-4B8C-83A1-F6EECF244321}">
+                <p14:modId xmlns:p14="http://schemas.microsoft.com/office/powerpoint/2010/main" val="416030751"/>
+              </p:ext>
+            </p:extLst>
+          </p:nvPr>
+        </p:nvGraphicFramePr>
+        <p:xfrm>
+          <a:off x="5294108" y="685800"/>
+          <a:ext cx="5759656" cy="4846967"/>
+        </p:xfrm>
+        <a:graphic>
+          <a:graphicData uri="http://schemas.openxmlformats.org/drawingml/2006/diagram">
+            <dgm:relIds xmlns:dgm="http://schemas.openxmlformats.org/drawingml/2006/diagram" xmlns:r="http://schemas.openxmlformats.org/officeDocument/2006/relationships" r:dm="rId4" r:lo="rId5" r:qs="rId6" r:cs="rId7"/>
+          </a:graphicData>
+        </a:graphic>
+      </p:graphicFrame>
+    </p:spTree>
+    <p:extLst>
+      <p:ext uri="{BB962C8B-B14F-4D97-AF65-F5344CB8AC3E}">
+        <p14:creationId xmlns:p14="http://schemas.microsoft.com/office/powerpoint/2010/main" val="1803381748"/>
+      </p:ext>
+    </p:extLst>
+  </p:cSld>
+  <p:clrMapOvr>
+    <a:masterClrMapping/>
+  </p:clrMapOvr>
+</p:sld>
+</file>
+
+<file path=ppt/slides/slide11.xml><?xml version="1.0" encoding="utf-8"?>
+<p:sld xmlns:a="http://schemas.openxmlformats.org/drawingml/2006/main" xmlns:r="http://schemas.openxmlformats.org/officeDocument/2006/relationships" xmlns:p="http://schemas.openxmlformats.org/presentationml/2006/main">
+  <p:cSld>
+    <p:bg>
+      <p:bgPr>
+        <a:blipFill>
+          <a:blip r:embed="rId2">
+            <a:duotone>
+              <a:schemeClr val="bg1">
+                <a:shade val="48000"/>
+                <a:satMod val="110000"/>
+                <a:lumMod val="40000"/>
+              </a:schemeClr>
+              <a:schemeClr val="bg1">
+                <a:tint val="90000"/>
+                <a:lumMod val="106000"/>
+              </a:schemeClr>
+            </a:duotone>
+          </a:blip>
+          <a:stretch/>
+        </a:blipFill>
+        <a:effectLst/>
+      </p:bgPr>
+    </p:bg>
+    <p:spTree>
+      <p:nvGrpSpPr>
+        <p:cNvPr id="1" name=""/>
+        <p:cNvGrpSpPr/>
+        <p:nvPr/>
+      </p:nvGrpSpPr>
+      <p:grpSpPr>
+        <a:xfrm>
+          <a:off x="0" y="0"/>
+          <a:ext cx="0" cy="0"/>
+          <a:chOff x="0" y="0"/>
+          <a:chExt cx="0" cy="0"/>
+        </a:xfrm>
+      </p:grpSpPr>
+      <p:pic>
+        <p:nvPicPr>
+          <p:cNvPr id="5" name="Picture 4" descr="A picture containing text, green, beverage, painted&#10;&#10;Description automatically generated">
+            <a:extLst>
+              <a:ext uri="{FF2B5EF4-FFF2-40B4-BE49-F238E27FC236}">
+                <a16:creationId xmlns:a16="http://schemas.microsoft.com/office/drawing/2014/main" id="{1078F5CD-E953-B747-B315-B09CADD402CF}"/>
+              </a:ext>
+            </a:extLst>
+          </p:cNvPr>
+          <p:cNvPicPr>
+            <a:picLocks noChangeAspect="1"/>
+          </p:cNvPicPr>
+          <p:nvPr/>
+        </p:nvPicPr>
+        <p:blipFill>
+          <a:blip r:embed="rId3">
+            <a:extLst>
+              <a:ext uri="{837473B0-CC2E-450A-ABE3-18F120FF3D39}">
+                <a1611:picAttrSrcUrl xmlns:a1611="http://schemas.microsoft.com/office/drawing/2016/11/main" r:id="rId4"/>
+              </a:ext>
+            </a:extLst>
+          </a:blip>
+          <a:stretch>
+            <a:fillRect/>
+          </a:stretch>
+        </p:blipFill>
+        <p:spPr>
+          <a:xfrm>
+            <a:off x="6562455" y="1701137"/>
+            <a:ext cx="4677405" cy="2993539"/>
+          </a:xfrm>
+          <a:prstGeom prst="rect">
+            <a:avLst/>
+          </a:prstGeom>
+          <a:ln>
+            <a:noFill/>
+          </a:ln>
+        </p:spPr>
+      </p:pic>
+      <p:sp>
+        <p:nvSpPr>
+          <p:cNvPr id="2" name="Title 1">
+            <a:extLst>
+              <a:ext uri="{FF2B5EF4-FFF2-40B4-BE49-F238E27FC236}">
+                <a16:creationId xmlns:a16="http://schemas.microsoft.com/office/drawing/2014/main" id="{64B1EACD-B8B4-DB43-A18A-FB3A0EF01670}"/>
+              </a:ext>
+            </a:extLst>
+          </p:cNvPr>
+          <p:cNvSpPr>
+            <a:spLocks noGrp="1"/>
+          </p:cNvSpPr>
+          <p:nvPr>
+            <p:ph type="title"/>
+          </p:nvPr>
+        </p:nvSpPr>
+        <p:spPr>
+          <a:xfrm>
+            <a:off x="685799" y="690479"/>
+            <a:ext cx="4957275" cy="1146825"/>
+          </a:xfrm>
+        </p:spPr>
+        <p:txBody>
+          <a:bodyPr>
+            <a:normAutofit/>
+          </a:bodyPr>
+          <a:lstStyle/>
+          <a:p>
+            <a:r>
+              <a:rPr lang="en-US" sz="3700" dirty="0">
+                <a:solidFill>
+                  <a:schemeClr val="accent1">
+                    <a:lumMod val="75000"/>
+                  </a:schemeClr>
+                </a:solidFill>
+              </a:rPr>
+              <a:t>FURTHER RESEARCH</a:t>
+            </a:r>
+          </a:p>
+        </p:txBody>
+      </p:sp>
+      <p:sp>
+        <p:nvSpPr>
+          <p:cNvPr id="3" name="Content Placeholder 2">
+            <a:extLst>
+              <a:ext uri="{FF2B5EF4-FFF2-40B4-BE49-F238E27FC236}">
+                <a16:creationId xmlns:a16="http://schemas.microsoft.com/office/drawing/2014/main" id="{B82A9D01-F067-0841-9CA2-16B60BACC40D}"/>
+              </a:ext>
+            </a:extLst>
+          </p:cNvPr>
+          <p:cNvSpPr>
+            <a:spLocks noGrp="1"/>
+          </p:cNvSpPr>
+          <p:nvPr>
+            <p:ph sz="quarter" idx="13"/>
+          </p:nvPr>
+        </p:nvSpPr>
+        <p:spPr>
+          <a:xfrm>
+            <a:off x="685800" y="2063395"/>
+            <a:ext cx="4957273" cy="3446103"/>
+          </a:xfrm>
+        </p:spPr>
+        <p:txBody>
+          <a:bodyPr>
+            <a:normAutofit/>
+          </a:bodyPr>
+          <a:lstStyle/>
+          <a:p>
+            <a:r>
+              <a:rPr lang="en-US" sz="1800" dirty="0">
+                <a:latin typeface="Calibri" panose="020F0502020204030204" pitchFamily="34" charset="0"/>
+                <a:cs typeface="Calibri" panose="020F0502020204030204" pitchFamily="34" charset="0"/>
+              </a:rPr>
+              <a:t>Mention how we can take our findings forward (particularly if we have plan for continuing with this data for the final project)</a:t>
+            </a:r>
+          </a:p>
+        </p:txBody>
+      </p:sp>
+      <p:sp>
+        <p:nvSpPr>
+          <p:cNvPr id="6" name="TextBox 5">
+            <a:extLst>
+              <a:ext uri="{FF2B5EF4-FFF2-40B4-BE49-F238E27FC236}">
+                <a16:creationId xmlns:a16="http://schemas.microsoft.com/office/drawing/2014/main" id="{9E854D90-7FB8-1740-B173-CEB26C78B799}"/>
+              </a:ext>
+            </a:extLst>
+          </p:cNvPr>
+          <p:cNvSpPr txBox="1"/>
+          <p:nvPr/>
+        </p:nvSpPr>
+        <p:spPr>
+          <a:xfrm>
+            <a:off x="9081898" y="4494621"/>
+            <a:ext cx="2157962" cy="200055"/>
+          </a:xfrm>
+          <a:prstGeom prst="rect">
+            <a:avLst/>
+          </a:prstGeom>
+          <a:solidFill>
+            <a:srgbClr val="000000"/>
+          </a:solidFill>
+        </p:spPr>
+        <p:txBody>
+          <a:bodyPr wrap="none" rtlCol="0">
+            <a:spAutoFit/>
+          </a:bodyPr>
+          <a:lstStyle/>
+          <a:p>
+            <a:pPr algn="r">
+              <a:spcAft>
+                <a:spcPts val="600"/>
+              </a:spcAft>
+            </a:pPr>
+            <a:r>
+              <a:rPr lang="en-US" sz="700">
+                <a:solidFill>
+                  <a:srgbClr val="FFFFFF"/>
+                </a:solidFill>
+                <a:hlinkClick r:id="rId4" tooltip="http://www.sagaciousnewsnetwork.com/child-narcissistic-parent-my-needs/">
+                  <a:extLst>
+                    <a:ext uri="{A12FA001-AC4F-418D-AE19-62706E023703}">
+                      <ahyp:hlinkClr xmlns:ahyp="http://schemas.microsoft.com/office/drawing/2018/hyperlinkcolor" val="tx"/>
+                    </a:ext>
+                  </a:extLst>
+                </a:hlinkClick>
+              </a:rPr>
+              <a:t>This Photo</a:t>
+            </a:r>
+            <a:r>
+              <a:rPr lang="en-US" sz="700">
+                <a:solidFill>
+                  <a:srgbClr val="FFFFFF"/>
+                </a:solidFill>
+              </a:rPr>
+              <a:t> by Unknown Author is licensed under </a:t>
+            </a:r>
+            <a:r>
+              <a:rPr lang="en-US" sz="700">
+                <a:solidFill>
+                  <a:srgbClr val="FFFFFF"/>
+                </a:solidFill>
+                <a:hlinkClick r:id="rId5" tooltip="https://creativecommons.org/licenses/by/3.0/">
+                  <a:extLst>
+                    <a:ext uri="{A12FA001-AC4F-418D-AE19-62706E023703}">
+                      <ahyp:hlinkClr xmlns:ahyp="http://schemas.microsoft.com/office/drawing/2018/hyperlinkcolor" val="tx"/>
+                    </a:ext>
+                  </a:extLst>
+                </a:hlinkClick>
+              </a:rPr>
+              <a:t>CC BY</a:t>
+            </a:r>
+            <a:endParaRPr lang="en-US" sz="700">
+              <a:solidFill>
+                <a:srgbClr val="FFFFFF"/>
+              </a:solidFill>
+            </a:endParaRPr>
+          </a:p>
+        </p:txBody>
+      </p:sp>
+    </p:spTree>
+    <p:extLst>
+      <p:ext uri="{BB962C8B-B14F-4D97-AF65-F5344CB8AC3E}">
+        <p14:creationId xmlns:p14="http://schemas.microsoft.com/office/powerpoint/2010/main" val="3216832741"/>
+      </p:ext>
+    </p:extLst>
+  </p:cSld>
+  <p:clrMapOvr>
+    <a:masterClrMapping/>
+  </p:clrMapOvr>
+</p:sld>
+</file>
+
+<file path=ppt/slides/slide12.xml><?xml version="1.0" encoding="utf-8"?>
+<p:sld xmlns:a="http://schemas.openxmlformats.org/drawingml/2006/main" xmlns:r="http://schemas.openxmlformats.org/officeDocument/2006/relationships" xmlns:p="http://schemas.openxmlformats.org/presentationml/2006/main">
+  <p:cSld>
+    <p:bg>
+      <p:bgPr>
+        <a:blipFill>
+          <a:blip r:embed="rId2">
+            <a:duotone>
+              <a:schemeClr val="bg1">
+                <a:shade val="48000"/>
+                <a:satMod val="110000"/>
+                <a:lumMod val="40000"/>
+              </a:schemeClr>
+              <a:schemeClr val="bg1">
+                <a:tint val="90000"/>
+                <a:lumMod val="106000"/>
+              </a:schemeClr>
+            </a:duotone>
+          </a:blip>
+          <a:stretch/>
+        </a:blipFill>
+        <a:effectLst/>
+      </p:bgPr>
+    </p:bg>
+    <p:spTree>
+      <p:nvGrpSpPr>
+        <p:cNvPr id="1" name=""/>
+        <p:cNvGrpSpPr/>
+        <p:nvPr/>
+      </p:nvGrpSpPr>
+      <p:grpSpPr>
+        <a:xfrm>
+          <a:off x="0" y="0"/>
+          <a:ext cx="0" cy="0"/>
+          <a:chOff x="0" y="0"/>
+          <a:chExt cx="0" cy="0"/>
+        </a:xfrm>
+      </p:grpSpPr>
+      <p:sp>
+        <p:nvSpPr>
+          <p:cNvPr id="2" name="Title 1">
+            <a:extLst>
+              <a:ext uri="{FF2B5EF4-FFF2-40B4-BE49-F238E27FC236}">
+                <a16:creationId xmlns:a16="http://schemas.microsoft.com/office/drawing/2014/main" id="{EBBD4232-D5D6-184B-B8EB-6439D502D204}"/>
+              </a:ext>
+            </a:extLst>
+          </p:cNvPr>
+          <p:cNvSpPr>
+            <a:spLocks noGrp="1"/>
+          </p:cNvSpPr>
+          <p:nvPr>
+            <p:ph type="title"/>
+          </p:nvPr>
+        </p:nvSpPr>
+        <p:spPr>
+          <a:xfrm>
+            <a:off x="446663" y="1304458"/>
+            <a:ext cx="3326650" cy="2901781"/>
+          </a:xfrm>
+        </p:spPr>
+        <p:txBody>
+          <a:bodyPr vert="horz" lIns="91440" tIns="45720" rIns="91440" bIns="45720" rtlCol="0" anchor="b">
+            <a:normAutofit/>
+          </a:bodyPr>
+          <a:lstStyle/>
+          <a:p>
+            <a:pPr algn="r"/>
+            <a:r>
+              <a:rPr lang="en-US" sz="4800" dirty="0"/>
+              <a:t>COMMENTS /</a:t>
+            </a:r>
+            <a:br>
+              <a:rPr lang="en-US" sz="4800" dirty="0"/>
+            </a:br>
+            <a:r>
+              <a:rPr lang="en-US" sz="4800" dirty="0"/>
+              <a:t> QUESTIONS?</a:t>
+            </a:r>
+          </a:p>
+        </p:txBody>
+      </p:sp>
+      <p:pic>
+        <p:nvPicPr>
+          <p:cNvPr id="5" name="Content Placeholder 4" descr="Text&#10;&#10;Description automatically generated">
+            <a:extLst>
+              <a:ext uri="{FF2B5EF4-FFF2-40B4-BE49-F238E27FC236}">
+                <a16:creationId xmlns:a16="http://schemas.microsoft.com/office/drawing/2014/main" id="{9A9228A2-BF7E-8B4A-AD58-F4A3A0F95581}"/>
+              </a:ext>
+            </a:extLst>
+          </p:cNvPr>
+          <p:cNvPicPr>
+            <a:picLocks noGrp="1" noChangeAspect="1"/>
+          </p:cNvPicPr>
+          <p:nvPr>
+            <p:ph sz="quarter" idx="13"/>
+          </p:nvPr>
+        </p:nvPicPr>
+        <p:blipFill>
+          <a:blip r:embed="rId3">
+            <a:extLst>
+              <a:ext uri="{837473B0-CC2E-450A-ABE3-18F120FF3D39}">
+                <a1611:picAttrSrcUrl xmlns:a1611="http://schemas.microsoft.com/office/drawing/2016/11/main" r:id="rId4"/>
+              </a:ext>
+            </a:extLst>
+          </a:blip>
+          <a:stretch>
+            <a:fillRect/>
+          </a:stretch>
+        </p:blipFill>
+        <p:spPr>
+          <a:xfrm>
+            <a:off x="5321367" y="1758820"/>
+            <a:ext cx="6174771" cy="3334376"/>
+          </a:xfrm>
+          <a:prstGeom prst="rect">
+            <a:avLst/>
+          </a:prstGeom>
+        </p:spPr>
+      </p:pic>
+      <p:sp>
+        <p:nvSpPr>
+          <p:cNvPr id="6" name="TextBox 5">
+            <a:extLst>
+              <a:ext uri="{FF2B5EF4-FFF2-40B4-BE49-F238E27FC236}">
+                <a16:creationId xmlns:a16="http://schemas.microsoft.com/office/drawing/2014/main" id="{A054DB01-79B7-A44D-A0B1-8096CC3EAD51}"/>
+              </a:ext>
+            </a:extLst>
+          </p:cNvPr>
+          <p:cNvSpPr txBox="1"/>
+          <p:nvPr/>
+        </p:nvSpPr>
+        <p:spPr>
+          <a:xfrm>
+            <a:off x="9221156" y="4893141"/>
+            <a:ext cx="2274982" cy="200055"/>
+          </a:xfrm>
+          <a:prstGeom prst="rect">
+            <a:avLst/>
+          </a:prstGeom>
+          <a:solidFill>
+            <a:srgbClr val="000000"/>
+          </a:solidFill>
+        </p:spPr>
+        <p:txBody>
+          <a:bodyPr wrap="none" rtlCol="0">
+            <a:spAutoFit/>
+          </a:bodyPr>
+          <a:lstStyle/>
+          <a:p>
+            <a:pPr algn="r">
+              <a:spcAft>
+                <a:spcPts val="600"/>
+              </a:spcAft>
+            </a:pPr>
+            <a:r>
+              <a:rPr lang="en-US" sz="700">
+                <a:solidFill>
+                  <a:srgbClr val="FFFFFF"/>
+                </a:solidFill>
+                <a:hlinkClick r:id="rId4" tooltip="https://commons.wikimedia.org/wiki/File:Thank-you-word-cloud.jpg">
+                  <a:extLst>
+                    <a:ext uri="{A12FA001-AC4F-418D-AE19-62706E023703}">
+                      <ahyp:hlinkClr xmlns:ahyp="http://schemas.microsoft.com/office/drawing/2018/hyperlinkcolor" val="tx"/>
+                    </a:ext>
+                  </a:extLst>
+                </a:hlinkClick>
+              </a:rPr>
+              <a:t>This Photo</a:t>
+            </a:r>
+            <a:r>
+              <a:rPr lang="en-US" sz="700">
+                <a:solidFill>
+                  <a:srgbClr val="FFFFFF"/>
+                </a:solidFill>
+              </a:rPr>
+              <a:t> by Unknown Author is licensed under </a:t>
+            </a:r>
+            <a:r>
+              <a:rPr lang="en-US" sz="700">
+                <a:solidFill>
+                  <a:srgbClr val="FFFFFF"/>
+                </a:solidFill>
+                <a:hlinkClick r:id="rId5" tooltip="https://creativecommons.org/licenses/by-sa/3.0/">
+                  <a:extLst>
+                    <a:ext uri="{A12FA001-AC4F-418D-AE19-62706E023703}">
+                      <ahyp:hlinkClr xmlns:ahyp="http://schemas.microsoft.com/office/drawing/2018/hyperlinkcolor" val="tx"/>
+                    </a:ext>
+                  </a:extLst>
+                </a:hlinkClick>
+              </a:rPr>
+              <a:t>CC BY-SA</a:t>
+            </a:r>
+            <a:endParaRPr lang="en-US" sz="700">
+              <a:solidFill>
+                <a:srgbClr val="FFFFFF"/>
+              </a:solidFill>
+            </a:endParaRPr>
+          </a:p>
+        </p:txBody>
+      </p:sp>
+    </p:spTree>
+    <p:extLst>
+      <p:ext uri="{BB962C8B-B14F-4D97-AF65-F5344CB8AC3E}">
+        <p14:creationId xmlns:p14="http://schemas.microsoft.com/office/powerpoint/2010/main" val="909605127"/>
+      </p:ext>
+    </p:extLst>
+  </p:cSld>
+  <p:clrMapOvr>
+    <a:masterClrMapping/>
+  </p:clrMapOvr>
+</p:sld>
+</file>
+
 <file path=ppt/slides/slide2.xml><?xml version="1.0" encoding="utf-8"?>
 <p:sld xmlns:a="http://schemas.openxmlformats.org/drawingml/2006/main" xmlns:r="http://schemas.openxmlformats.org/officeDocument/2006/relationships" xmlns:p="http://schemas.openxmlformats.org/presentationml/2006/main">
   <p:cSld>
@@ -9357,7 +10402,7 @@
         </p:blipFill>
         <p:spPr>
           <a:xfrm>
-            <a:off x="20" y="10"/>
+            <a:off x="20" y="0"/>
             <a:ext cx="12191980" cy="6857990"/>
           </a:xfrm>
           <a:prstGeom prst="rect">
@@ -9383,8 +10428,8 @@
         </p:nvSpPr>
         <p:spPr>
           <a:xfrm>
-            <a:off x="5079150" y="742950"/>
-            <a:ext cx="6413335" cy="1636675"/>
+            <a:off x="5816270" y="488173"/>
+            <a:ext cx="4503388" cy="945891"/>
           </a:xfrm>
         </p:spPr>
         <p:txBody>
@@ -9473,8 +10518,8 @@
         </p:nvSpPr>
         <p:spPr>
           <a:xfrm>
-            <a:off x="5800724" y="2803028"/>
-            <a:ext cx="3396853" cy="923330"/>
+            <a:off x="953563" y="1359092"/>
+            <a:ext cx="9664674" cy="2246769"/>
           </a:xfrm>
           <a:prstGeom prst="rect">
             <a:avLst/>
@@ -9492,26 +10537,56 @@
           </a:bodyPr>
           <a:lstStyle/>
           <a:p>
-            <a:r>
-              <a:rPr lang="en-US" dirty="0">
+            <a:pPr marL="285750" indent="-285750">
+              <a:buFont typeface="Arial" panose="020B0604020202020204" pitchFamily="34" charset="0"/>
+              <a:buChar char="•"/>
+            </a:pPr>
+            <a:r>
+              <a:rPr lang="en-US" sz="2000" dirty="0">
                 <a:latin typeface="Calibri" panose="020F0502020204030204" pitchFamily="34" charset="0"/>
                 <a:cs typeface="Calibri" panose="020F0502020204030204" pitchFamily="34" charset="0"/>
               </a:rPr>
-              <a:t>SMART question, lay out the plan of the presentation</a:t>
-            </a:r>
-          </a:p>
-          <a:p>
-            <a:r>
-              <a:rPr lang="en-US">
+              <a:t>Is there a significant difference between the proportion of males vs nonmales who are employed given their degree in higher education?</a:t>
+            </a:r>
+          </a:p>
+          <a:p>
+            <a:pPr marL="285750" indent="-285750">
+              <a:buFont typeface="Arial" panose="020B0604020202020204" pitchFamily="34" charset="0"/>
+              <a:buChar char="•"/>
+            </a:pPr>
+            <a:r>
+              <a:rPr lang="en-US" sz="2000" dirty="0">
                 <a:latin typeface="Calibri" panose="020F0502020204030204" pitchFamily="34" charset="0"/>
                 <a:cs typeface="Calibri" panose="020F0502020204030204" pitchFamily="34" charset="0"/>
               </a:rPr>
-              <a:t>Test comment by Nema</a:t>
-            </a:r>
-            <a:endParaRPr lang="en-US" dirty="0">
-              <a:latin typeface="Calibri" panose="020F0502020204030204" pitchFamily="34" charset="0"/>
-              <a:cs typeface="Calibri" panose="020F0502020204030204" pitchFamily="34" charset="0"/>
-            </a:endParaRPr>
+              <a:t>Is there a difference in the average number of computer skills acquired based on level of education?</a:t>
+            </a:r>
+          </a:p>
+          <a:p>
+            <a:pPr marL="285750" indent="-285750">
+              <a:buFont typeface="Arial" panose="020B0604020202020204" pitchFamily="34" charset="0"/>
+              <a:buChar char="•"/>
+            </a:pPr>
+            <a:r>
+              <a:rPr lang="en-US" sz="2000" dirty="0">
+                <a:latin typeface="Calibri" panose="020F0502020204030204" pitchFamily="34" charset="0"/>
+                <a:cs typeface="Calibri" panose="020F0502020204030204" pitchFamily="34" charset="0"/>
+              </a:rPr>
+              <a:t>Is age a significant factor in determining whether an individual is a professional developer or not?</a:t>
+            </a:r>
+          </a:p>
+          <a:p>
+            <a:pPr marL="285750" indent="-285750">
+              <a:buFont typeface="Arial" panose="020B0604020202020204" pitchFamily="34" charset="0"/>
+              <a:buChar char="•"/>
+            </a:pPr>
+            <a:r>
+              <a:rPr lang="en-US" sz="2000" dirty="0">
+                <a:latin typeface="Calibri" panose="020F0502020204030204" pitchFamily="34" charset="0"/>
+                <a:cs typeface="Calibri" panose="020F0502020204030204" pitchFamily="34" charset="0"/>
+              </a:rPr>
+              <a:t>Is status of mental health associated with a programmer’s previous salary?</a:t>
+            </a:r>
           </a:p>
         </p:txBody>
       </p:sp>
@@ -9726,6 +10801,72 @@
 <file path=ppt/slides/slide4.xml><?xml version="1.0" encoding="utf-8"?>
 <p:sld xmlns:a="http://schemas.openxmlformats.org/drawingml/2006/main" xmlns:r="http://schemas.openxmlformats.org/officeDocument/2006/relationships" xmlns:p="http://schemas.openxmlformats.org/presentationml/2006/main">
   <p:cSld>
+    <p:spTree>
+      <p:nvGrpSpPr>
+        <p:cNvPr id="1" name=""/>
+        <p:cNvGrpSpPr/>
+        <p:nvPr/>
+      </p:nvGrpSpPr>
+      <p:grpSpPr>
+        <a:xfrm>
+          <a:off x="0" y="0"/>
+          <a:ext cx="0" cy="0"/>
+          <a:chOff x="0" y="0"/>
+          <a:chExt cx="0" cy="0"/>
+        </a:xfrm>
+      </p:grpSpPr>
+      <p:pic>
+        <p:nvPicPr>
+          <p:cNvPr id="9" name="Picture 8" descr="Two cartoon characters in a lab&#10;&#10;Description automatically generated">
+            <a:extLst>
+              <a:ext uri="{FF2B5EF4-FFF2-40B4-BE49-F238E27FC236}">
+                <a16:creationId xmlns:a16="http://schemas.microsoft.com/office/drawing/2014/main" id="{EB553CF8-7E2F-84C4-A9AA-8C06DEBF8C54}"/>
+              </a:ext>
+            </a:extLst>
+          </p:cNvPr>
+          <p:cNvPicPr>
+            <a:picLocks noChangeAspect="1"/>
+          </p:cNvPicPr>
+          <p:nvPr/>
+        </p:nvPicPr>
+        <p:blipFill>
+          <a:blip r:embed="rId2">
+            <a:extLst>
+              <a:ext uri="{837473B0-CC2E-450A-ABE3-18F120FF3D39}">
+                <a1611:picAttrSrcUrl xmlns:a1611="http://schemas.microsoft.com/office/drawing/2016/11/main" r:id="rId3"/>
+              </a:ext>
+            </a:extLst>
+          </a:blip>
+          <a:stretch>
+            <a:fillRect/>
+          </a:stretch>
+        </p:blipFill>
+        <p:spPr>
+          <a:xfrm>
+            <a:off x="2840225" y="1811165"/>
+            <a:ext cx="6085663" cy="2434264"/>
+          </a:xfrm>
+          <a:prstGeom prst="rect">
+            <a:avLst/>
+          </a:prstGeom>
+        </p:spPr>
+      </p:pic>
+    </p:spTree>
+    <p:extLst>
+      <p:ext uri="{BB962C8B-B14F-4D97-AF65-F5344CB8AC3E}">
+        <p14:creationId xmlns:p14="http://schemas.microsoft.com/office/powerpoint/2010/main" val="1598900383"/>
+      </p:ext>
+    </p:extLst>
+  </p:cSld>
+  <p:clrMapOvr>
+    <a:masterClrMapping/>
+  </p:clrMapOvr>
+</p:sld>
+</file>
+
+<file path=ppt/slides/slide5.xml><?xml version="1.0" encoding="utf-8"?>
+<p:sld xmlns:a="http://schemas.openxmlformats.org/drawingml/2006/main" xmlns:r="http://schemas.openxmlformats.org/officeDocument/2006/relationships" xmlns:p="http://schemas.openxmlformats.org/presentationml/2006/main">
+  <p:cSld>
     <p:bg>
       <p:bgPr>
         <a:blipFill>
@@ -9779,7 +10920,7 @@
         </p:nvSpPr>
         <p:spPr>
           <a:xfrm>
-            <a:off x="6556354" y="571500"/>
+            <a:off x="6551610" y="349898"/>
             <a:ext cx="4526328" cy="1266265"/>
           </a:xfrm>
         </p:spPr>
@@ -9790,7 +10931,7 @@
           <a:lstStyle/>
           <a:p>
             <a:r>
-              <a:rPr lang="en-US" sz="4100"/>
+              <a:rPr lang="en-US" sz="4100" dirty="0"/>
               <a:t>Hypothesis Testing</a:t>
             </a:r>
           </a:p>
@@ -9814,7 +10955,7 @@
         </p:nvSpPr>
         <p:spPr>
           <a:xfrm>
-            <a:off x="6551610" y="2071048"/>
+            <a:off x="598680" y="704451"/>
             <a:ext cx="4531072" cy="3072290"/>
           </a:xfrm>
         </p:spPr>
@@ -9830,11 +10971,11 @@
               </a:lnSpc>
             </a:pPr>
             <a:r>
-              <a:rPr lang="en-US" sz="1600">
+              <a:rPr lang="en-US" sz="1600" b="1" dirty="0">
                 <a:latin typeface="Calibri" panose="020F0502020204030204" pitchFamily="34" charset="0"/>
                 <a:cs typeface="Calibri" panose="020F0502020204030204" pitchFamily="34" charset="0"/>
               </a:rPr>
-              <a:t>CREATING A COMMUNITY WELL BEING AMONG THE Employee AND STAFFS ENHANCESS THE TOGETHERNESS AND CONECTEDNESS.</a:t>
+              <a:t>Is there a significant difference between the proportion of males vs nonmales who are employed given their degree in higher education?</a:t>
             </a:r>
           </a:p>
           <a:p>
@@ -9843,13 +10984,10 @@
                 <a:spcPct val="110000"/>
               </a:lnSpc>
             </a:pPr>
-            <a:r>
-              <a:rPr lang="en-US" sz="1600">
-                <a:latin typeface="Calibri" panose="020F0502020204030204" pitchFamily="34" charset="0"/>
-                <a:cs typeface="Calibri" panose="020F0502020204030204" pitchFamily="34" charset="0"/>
-              </a:rPr>
-              <a:t>everybody LIKES TO WORK IN A PLACE WHICH PROVIDES A SENSE OF PURPOSE &amp; BELONGING.</a:t>
-            </a:r>
+            <a:endParaRPr lang="en-US" sz="1600" b="1" dirty="0">
+              <a:latin typeface="Calibri" panose="020F0502020204030204" pitchFamily="34" charset="0"/>
+              <a:cs typeface="Calibri" panose="020F0502020204030204" pitchFamily="34" charset="0"/>
+            </a:endParaRPr>
           </a:p>
           <a:p>
             <a:pPr>
@@ -9857,52 +10995,13 @@
                 <a:spcPct val="110000"/>
               </a:lnSpc>
             </a:pPr>
-            <a:r>
-              <a:rPr lang="en-US" sz="1600">
-                <a:latin typeface="Calibri" panose="020F0502020204030204" pitchFamily="34" charset="0"/>
-                <a:cs typeface="Calibri" panose="020F0502020204030204" pitchFamily="34" charset="0"/>
-              </a:rPr>
-              <a:t>Community wellbeing can be a core enabler of employee engagement and organizational performance.</a:t>
-            </a:r>
-          </a:p>
-        </p:txBody>
-      </p:sp>
-      <p:pic>
-        <p:nvPicPr>
-          <p:cNvPr id="9" name="Picture 8" descr="Two cartoon characters in a lab&#10;&#10;Description automatically generated">
-            <a:extLst>
-              <a:ext uri="{FF2B5EF4-FFF2-40B4-BE49-F238E27FC236}">
-                <a16:creationId xmlns:a16="http://schemas.microsoft.com/office/drawing/2014/main" id="{EB553CF8-7E2F-84C4-A9AA-8C06DEBF8C54}"/>
-              </a:ext>
-            </a:extLst>
-          </p:cNvPr>
-          <p:cNvPicPr>
-            <a:picLocks noChangeAspect="1"/>
-          </p:cNvPicPr>
-          <p:nvPr/>
-        </p:nvPicPr>
-        <p:blipFill>
-          <a:blip r:embed="rId3">
-            <a:extLst>
-              <a:ext uri="{837473B0-CC2E-450A-ABE3-18F120FF3D39}">
-                <a1611:picAttrSrcUrl xmlns:a1611="http://schemas.microsoft.com/office/drawing/2016/11/main" r:id="rId4"/>
-              </a:ext>
-            </a:extLst>
-          </a:blip>
-          <a:stretch>
-            <a:fillRect/>
-          </a:stretch>
-        </p:blipFill>
-        <p:spPr>
-          <a:xfrm>
-            <a:off x="750708" y="1779202"/>
-            <a:ext cx="5099864" cy="2039945"/>
-          </a:xfrm>
-          <a:prstGeom prst="rect">
-            <a:avLst/>
-          </a:prstGeom>
-        </p:spPr>
-      </p:pic>
+            <a:endParaRPr lang="en-US" sz="1600" dirty="0">
+              <a:latin typeface="Calibri" panose="020F0502020204030204" pitchFamily="34" charset="0"/>
+              <a:cs typeface="Calibri" panose="020F0502020204030204" pitchFamily="34" charset="0"/>
+            </a:endParaRPr>
+          </a:p>
+        </p:txBody>
+      </p:sp>
     </p:spTree>
     <p:extLst>
       <p:ext uri="{BB962C8B-B14F-4D97-AF65-F5344CB8AC3E}">
@@ -9916,7 +11015,394 @@
 </p:sld>
 </file>
 
-<file path=ppt/slides/slide5.xml><?xml version="1.0" encoding="utf-8"?>
+<file path=ppt/slides/slide6.xml><?xml version="1.0" encoding="utf-8"?>
+<p:sld xmlns:a="http://schemas.openxmlformats.org/drawingml/2006/main" xmlns:r="http://schemas.openxmlformats.org/officeDocument/2006/relationships" xmlns:p="http://schemas.openxmlformats.org/presentationml/2006/main">
+  <p:cSld>
+    <p:spTree>
+      <p:nvGrpSpPr>
+        <p:cNvPr id="1" name=""/>
+        <p:cNvGrpSpPr/>
+        <p:nvPr/>
+      </p:nvGrpSpPr>
+      <p:grpSpPr>
+        <a:xfrm>
+          <a:off x="0" y="0"/>
+          <a:ext cx="0" cy="0"/>
+          <a:chOff x="0" y="0"/>
+          <a:chExt cx="0" cy="0"/>
+        </a:xfrm>
+      </p:grpSpPr>
+      <p:sp>
+        <p:nvSpPr>
+          <p:cNvPr id="2" name="Title 1">
+            <a:extLst>
+              <a:ext uri="{FF2B5EF4-FFF2-40B4-BE49-F238E27FC236}">
+                <a16:creationId xmlns:a16="http://schemas.microsoft.com/office/drawing/2014/main" id="{0B0FA88E-F5CB-F94E-B3CC-A32DC675F506}"/>
+              </a:ext>
+            </a:extLst>
+          </p:cNvPr>
+          <p:cNvSpPr>
+            <a:spLocks noGrp="1"/>
+          </p:cNvSpPr>
+          <p:nvPr>
+            <p:ph type="title"/>
+          </p:nvPr>
+        </p:nvSpPr>
+        <p:spPr>
+          <a:xfrm>
+            <a:off x="6551610" y="349898"/>
+            <a:ext cx="4526328" cy="1266265"/>
+          </a:xfrm>
+        </p:spPr>
+        <p:txBody>
+          <a:bodyPr>
+            <a:normAutofit/>
+          </a:bodyPr>
+          <a:lstStyle/>
+          <a:p>
+            <a:r>
+              <a:rPr lang="en-US" sz="4100" dirty="0"/>
+              <a:t>Hypothesis Testing</a:t>
+            </a:r>
+          </a:p>
+        </p:txBody>
+      </p:sp>
+      <p:sp>
+        <p:nvSpPr>
+          <p:cNvPr id="3" name="Content Placeholder 2">
+            <a:extLst>
+              <a:ext uri="{FF2B5EF4-FFF2-40B4-BE49-F238E27FC236}">
+                <a16:creationId xmlns:a16="http://schemas.microsoft.com/office/drawing/2014/main" id="{66E4F873-2D5F-D642-A6DA-AD596F9C7D00}"/>
+              </a:ext>
+            </a:extLst>
+          </p:cNvPr>
+          <p:cNvSpPr>
+            <a:spLocks noGrp="1"/>
+          </p:cNvSpPr>
+          <p:nvPr>
+            <p:ph sz="quarter" idx="13"/>
+          </p:nvPr>
+        </p:nvSpPr>
+        <p:spPr>
+          <a:xfrm>
+            <a:off x="859937" y="713781"/>
+            <a:ext cx="4531072" cy="3072290"/>
+          </a:xfrm>
+        </p:spPr>
+        <p:txBody>
+          <a:bodyPr anchor="t">
+            <a:normAutofit/>
+          </a:bodyPr>
+          <a:lstStyle/>
+          <a:p>
+            <a:pPr marL="285750" indent="-285750">
+              <a:buFont typeface="Arial" panose="020B0604020202020204" pitchFamily="34" charset="0"/>
+              <a:buChar char="•"/>
+            </a:pPr>
+            <a:r>
+              <a:rPr lang="en-US" sz="1600" dirty="0">
+                <a:latin typeface="Calibri" panose="020F0502020204030204" pitchFamily="34" charset="0"/>
+                <a:cs typeface="Calibri" panose="020F0502020204030204" pitchFamily="34" charset="0"/>
+              </a:rPr>
+              <a:t>Is there a difference in the average number of computer skills acquired based on level of education?</a:t>
+            </a:r>
+          </a:p>
+          <a:p>
+            <a:pPr>
+              <a:lnSpc>
+                <a:spcPct val="110000"/>
+              </a:lnSpc>
+            </a:pPr>
+            <a:endParaRPr lang="en-US" sz="1600" b="1" dirty="0">
+              <a:latin typeface="Calibri" panose="020F0502020204030204" pitchFamily="34" charset="0"/>
+              <a:cs typeface="Calibri" panose="020F0502020204030204" pitchFamily="34" charset="0"/>
+            </a:endParaRPr>
+          </a:p>
+          <a:p>
+            <a:pPr>
+              <a:lnSpc>
+                <a:spcPct val="110000"/>
+              </a:lnSpc>
+            </a:pPr>
+            <a:endParaRPr lang="en-US" sz="1600" dirty="0">
+              <a:latin typeface="Calibri" panose="020F0502020204030204" pitchFamily="34" charset="0"/>
+              <a:cs typeface="Calibri" panose="020F0502020204030204" pitchFamily="34" charset="0"/>
+            </a:endParaRPr>
+          </a:p>
+        </p:txBody>
+      </p:sp>
+    </p:spTree>
+    <p:extLst>
+      <p:ext uri="{BB962C8B-B14F-4D97-AF65-F5344CB8AC3E}">
+        <p14:creationId xmlns:p14="http://schemas.microsoft.com/office/powerpoint/2010/main" val="2895819652"/>
+      </p:ext>
+    </p:extLst>
+  </p:cSld>
+  <p:clrMapOvr>
+    <a:masterClrMapping/>
+  </p:clrMapOvr>
+</p:sld>
+</file>
+
+<file path=ppt/slides/slide7.xml><?xml version="1.0" encoding="utf-8"?>
+<p:sld xmlns:a="http://schemas.openxmlformats.org/drawingml/2006/main" xmlns:r="http://schemas.openxmlformats.org/officeDocument/2006/relationships" xmlns:p="http://schemas.openxmlformats.org/presentationml/2006/main">
+  <p:cSld>
+    <p:spTree>
+      <p:nvGrpSpPr>
+        <p:cNvPr id="1" name=""/>
+        <p:cNvGrpSpPr/>
+        <p:nvPr/>
+      </p:nvGrpSpPr>
+      <p:grpSpPr>
+        <a:xfrm>
+          <a:off x="0" y="0"/>
+          <a:ext cx="0" cy="0"/>
+          <a:chOff x="0" y="0"/>
+          <a:chExt cx="0" cy="0"/>
+        </a:xfrm>
+      </p:grpSpPr>
+      <p:sp>
+        <p:nvSpPr>
+          <p:cNvPr id="2" name="Title 1">
+            <a:extLst>
+              <a:ext uri="{FF2B5EF4-FFF2-40B4-BE49-F238E27FC236}">
+                <a16:creationId xmlns:a16="http://schemas.microsoft.com/office/drawing/2014/main" id="{0B0FA88E-F5CB-F94E-B3CC-A32DC675F506}"/>
+              </a:ext>
+            </a:extLst>
+          </p:cNvPr>
+          <p:cNvSpPr>
+            <a:spLocks noGrp="1"/>
+          </p:cNvSpPr>
+          <p:nvPr>
+            <p:ph type="title"/>
+          </p:nvPr>
+        </p:nvSpPr>
+        <p:spPr>
+          <a:xfrm>
+            <a:off x="6551610" y="349898"/>
+            <a:ext cx="4526328" cy="1266265"/>
+          </a:xfrm>
+        </p:spPr>
+        <p:txBody>
+          <a:bodyPr>
+            <a:normAutofit/>
+          </a:bodyPr>
+          <a:lstStyle/>
+          <a:p>
+            <a:r>
+              <a:rPr lang="en-US" sz="4100" dirty="0"/>
+              <a:t>Hypothesis Testing</a:t>
+            </a:r>
+          </a:p>
+        </p:txBody>
+      </p:sp>
+      <p:sp>
+        <p:nvSpPr>
+          <p:cNvPr id="3" name="Content Placeholder 2">
+            <a:extLst>
+              <a:ext uri="{FF2B5EF4-FFF2-40B4-BE49-F238E27FC236}">
+                <a16:creationId xmlns:a16="http://schemas.microsoft.com/office/drawing/2014/main" id="{66E4F873-2D5F-D642-A6DA-AD596F9C7D00}"/>
+              </a:ext>
+            </a:extLst>
+          </p:cNvPr>
+          <p:cNvSpPr>
+            <a:spLocks noGrp="1"/>
+          </p:cNvSpPr>
+          <p:nvPr>
+            <p:ph sz="quarter" idx="13"/>
+          </p:nvPr>
+        </p:nvSpPr>
+        <p:spPr>
+          <a:xfrm>
+            <a:off x="962574" y="695120"/>
+            <a:ext cx="4531072" cy="3072290"/>
+          </a:xfrm>
+        </p:spPr>
+        <p:txBody>
+          <a:bodyPr anchor="t">
+            <a:normAutofit/>
+          </a:bodyPr>
+          <a:lstStyle/>
+          <a:p>
+            <a:pPr marL="285750" indent="-285750">
+              <a:buFont typeface="Arial" panose="020B0604020202020204" pitchFamily="34" charset="0"/>
+              <a:buChar char="•"/>
+            </a:pPr>
+            <a:r>
+              <a:rPr lang="en-US" sz="1600" dirty="0">
+                <a:latin typeface="Calibri" panose="020F0502020204030204" pitchFamily="34" charset="0"/>
+                <a:cs typeface="Calibri" panose="020F0502020204030204" pitchFamily="34" charset="0"/>
+              </a:rPr>
+              <a:t>Is age a significant factor in determining whether an individual is a professional developer or not?</a:t>
+            </a:r>
+          </a:p>
+          <a:p>
+            <a:pPr>
+              <a:lnSpc>
+                <a:spcPct val="110000"/>
+              </a:lnSpc>
+            </a:pPr>
+            <a:endParaRPr lang="en-US" sz="1600" b="1" dirty="0">
+              <a:latin typeface="Calibri" panose="020F0502020204030204" pitchFamily="34" charset="0"/>
+              <a:cs typeface="Calibri" panose="020F0502020204030204" pitchFamily="34" charset="0"/>
+            </a:endParaRPr>
+          </a:p>
+          <a:p>
+            <a:pPr>
+              <a:lnSpc>
+                <a:spcPct val="110000"/>
+              </a:lnSpc>
+            </a:pPr>
+            <a:endParaRPr lang="en-US" sz="1600" dirty="0">
+              <a:latin typeface="Calibri" panose="020F0502020204030204" pitchFamily="34" charset="0"/>
+              <a:cs typeface="Calibri" panose="020F0502020204030204" pitchFamily="34" charset="0"/>
+            </a:endParaRPr>
+          </a:p>
+        </p:txBody>
+      </p:sp>
+    </p:spTree>
+    <p:extLst>
+      <p:ext uri="{BB962C8B-B14F-4D97-AF65-F5344CB8AC3E}">
+        <p14:creationId xmlns:p14="http://schemas.microsoft.com/office/powerpoint/2010/main" val="3148869259"/>
+      </p:ext>
+    </p:extLst>
+  </p:cSld>
+  <p:clrMapOvr>
+    <a:masterClrMapping/>
+  </p:clrMapOvr>
+</p:sld>
+</file>
+
+<file path=ppt/slides/slide8.xml><?xml version="1.0" encoding="utf-8"?>
+<p:sld xmlns:a="http://schemas.openxmlformats.org/drawingml/2006/main" xmlns:r="http://schemas.openxmlformats.org/officeDocument/2006/relationships" xmlns:p="http://schemas.openxmlformats.org/presentationml/2006/main">
+  <p:cSld>
+    <p:spTree>
+      <p:nvGrpSpPr>
+        <p:cNvPr id="1" name=""/>
+        <p:cNvGrpSpPr/>
+        <p:nvPr/>
+      </p:nvGrpSpPr>
+      <p:grpSpPr>
+        <a:xfrm>
+          <a:off x="0" y="0"/>
+          <a:ext cx="0" cy="0"/>
+          <a:chOff x="0" y="0"/>
+          <a:chExt cx="0" cy="0"/>
+        </a:xfrm>
+      </p:grpSpPr>
+      <p:sp>
+        <p:nvSpPr>
+          <p:cNvPr id="2" name="Title 1">
+            <a:extLst>
+              <a:ext uri="{FF2B5EF4-FFF2-40B4-BE49-F238E27FC236}">
+                <a16:creationId xmlns:a16="http://schemas.microsoft.com/office/drawing/2014/main" id="{0B0FA88E-F5CB-F94E-B3CC-A32DC675F506}"/>
+              </a:ext>
+            </a:extLst>
+          </p:cNvPr>
+          <p:cNvSpPr>
+            <a:spLocks noGrp="1"/>
+          </p:cNvSpPr>
+          <p:nvPr>
+            <p:ph type="title"/>
+          </p:nvPr>
+        </p:nvSpPr>
+        <p:spPr>
+          <a:xfrm>
+            <a:off x="6551610" y="349898"/>
+            <a:ext cx="4526328" cy="1266265"/>
+          </a:xfrm>
+        </p:spPr>
+        <p:txBody>
+          <a:bodyPr>
+            <a:normAutofit/>
+          </a:bodyPr>
+          <a:lstStyle/>
+          <a:p>
+            <a:r>
+              <a:rPr lang="en-US" sz="4100" dirty="0"/>
+              <a:t>Hypothesis Testing</a:t>
+            </a:r>
+          </a:p>
+        </p:txBody>
+      </p:sp>
+      <p:sp>
+        <p:nvSpPr>
+          <p:cNvPr id="3" name="Content Placeholder 2">
+            <a:extLst>
+              <a:ext uri="{FF2B5EF4-FFF2-40B4-BE49-F238E27FC236}">
+                <a16:creationId xmlns:a16="http://schemas.microsoft.com/office/drawing/2014/main" id="{66E4F873-2D5F-D642-A6DA-AD596F9C7D00}"/>
+              </a:ext>
+            </a:extLst>
+          </p:cNvPr>
+          <p:cNvSpPr>
+            <a:spLocks noGrp="1"/>
+          </p:cNvSpPr>
+          <p:nvPr>
+            <p:ph sz="quarter" idx="13"/>
+          </p:nvPr>
+        </p:nvSpPr>
+        <p:spPr>
+          <a:xfrm>
+            <a:off x="757300" y="648467"/>
+            <a:ext cx="4531072" cy="3072290"/>
+          </a:xfrm>
+        </p:spPr>
+        <p:txBody>
+          <a:bodyPr anchor="t">
+            <a:normAutofit/>
+          </a:bodyPr>
+          <a:lstStyle/>
+          <a:p>
+            <a:pPr marL="285750" indent="-285750">
+              <a:buFont typeface="Arial" panose="020B0604020202020204" pitchFamily="34" charset="0"/>
+              <a:buChar char="•"/>
+            </a:pPr>
+            <a:r>
+              <a:rPr lang="en-US" sz="1600" dirty="0">
+                <a:latin typeface="Calibri" panose="020F0502020204030204" pitchFamily="34" charset="0"/>
+                <a:cs typeface="Calibri" panose="020F0502020204030204" pitchFamily="34" charset="0"/>
+              </a:rPr>
+              <a:t>Is status of mental health associated with a programmer’s previous salary?</a:t>
+            </a:r>
+          </a:p>
+          <a:p>
+            <a:pPr>
+              <a:lnSpc>
+                <a:spcPct val="110000"/>
+              </a:lnSpc>
+            </a:pPr>
+            <a:endParaRPr lang="en-US" sz="1600" b="1" dirty="0">
+              <a:latin typeface="Calibri" panose="020F0502020204030204" pitchFamily="34" charset="0"/>
+              <a:cs typeface="Calibri" panose="020F0502020204030204" pitchFamily="34" charset="0"/>
+            </a:endParaRPr>
+          </a:p>
+          <a:p>
+            <a:pPr>
+              <a:lnSpc>
+                <a:spcPct val="110000"/>
+              </a:lnSpc>
+            </a:pPr>
+            <a:endParaRPr lang="en-US" sz="1600" dirty="0">
+              <a:latin typeface="Calibri" panose="020F0502020204030204" pitchFamily="34" charset="0"/>
+              <a:cs typeface="Calibri" panose="020F0502020204030204" pitchFamily="34" charset="0"/>
+            </a:endParaRPr>
+          </a:p>
+        </p:txBody>
+      </p:sp>
+    </p:spTree>
+    <p:extLst>
+      <p:ext uri="{BB962C8B-B14F-4D97-AF65-F5344CB8AC3E}">
+        <p14:creationId xmlns:p14="http://schemas.microsoft.com/office/powerpoint/2010/main" val="156836234"/>
+      </p:ext>
+    </p:extLst>
+  </p:cSld>
+  <p:clrMapOvr>
+    <a:masterClrMapping/>
+  </p:clrMapOvr>
+</p:sld>
+</file>
+
+<file path=ppt/slides/slide9.xml><?xml version="1.0" encoding="utf-8"?>
 <p:sld xmlns:a="http://schemas.openxmlformats.org/drawingml/2006/main" xmlns:r="http://schemas.openxmlformats.org/officeDocument/2006/relationships" xmlns:p="http://schemas.openxmlformats.org/presentationml/2006/main">
   <p:cSld>
     <p:bg>
@@ -10170,831 +11656,6 @@
       <p:bldP spid="2" grpId="0"/>
     </p:bldLst>
   </p:timing>
-</p:sld>
-</file>
-
-<file path=ppt/slides/slide6.xml><?xml version="1.0" encoding="utf-8"?>
-<p:sld xmlns:a="http://schemas.openxmlformats.org/drawingml/2006/main" xmlns:r="http://schemas.openxmlformats.org/officeDocument/2006/relationships" xmlns:p="http://schemas.openxmlformats.org/presentationml/2006/main">
-  <p:cSld>
-    <p:bg>
-      <p:bgPr>
-        <a:blipFill>
-          <a:blip r:embed="rId2">
-            <a:duotone>
-              <a:schemeClr val="bg1">
-                <a:shade val="48000"/>
-                <a:satMod val="110000"/>
-                <a:lumMod val="40000"/>
-              </a:schemeClr>
-              <a:schemeClr val="bg1">
-                <a:tint val="90000"/>
-                <a:lumMod val="106000"/>
-              </a:schemeClr>
-            </a:duotone>
-          </a:blip>
-          <a:stretch/>
-        </a:blipFill>
-        <a:effectLst/>
-      </p:bgPr>
-    </p:bg>
-    <p:spTree>
-      <p:nvGrpSpPr>
-        <p:cNvPr id="1" name=""/>
-        <p:cNvGrpSpPr/>
-        <p:nvPr/>
-      </p:nvGrpSpPr>
-      <p:grpSpPr>
-        <a:xfrm>
-          <a:off x="0" y="0"/>
-          <a:ext cx="0" cy="0"/>
-          <a:chOff x="0" y="0"/>
-          <a:chExt cx="0" cy="0"/>
-        </a:xfrm>
-      </p:grpSpPr>
-      <p:pic>
-        <p:nvPicPr>
-          <p:cNvPr id="10" name="Picture 9">
-            <a:extLst>
-              <a:ext uri="{FF2B5EF4-FFF2-40B4-BE49-F238E27FC236}">
-                <a16:creationId xmlns:a16="http://schemas.microsoft.com/office/drawing/2014/main" id="{05C90836-5ADB-4D63-A39D-D9BC0E10B492}"/>
-              </a:ext>
-              <a:ext uri="{C183D7F6-B498-43B3-948B-1728B52AA6E4}">
-                <adec:decorative xmlns:adec="http://schemas.microsoft.com/office/drawing/2017/decorative" val="1"/>
-              </a:ext>
-            </a:extLst>
-          </p:cNvPr>
-          <p:cNvPicPr>
-            <a:picLocks noGrp="1" noRot="1" noChangeAspect="1" noMove="1" noResize="1" noEditPoints="1" noAdjustHandles="1" noChangeArrowheads="1" noChangeShapeType="1" noCrop="1"/>
-          </p:cNvPicPr>
-          <p:nvPr>
-            <p:extLst>
-              <p:ext uri="{386F3935-93C4-4BCD-93E2-E3B085C9AB24}">
-                <p16:designElem xmlns:p16="http://schemas.microsoft.com/office/powerpoint/2015/main" val="1"/>
-              </p:ext>
-            </p:extLst>
-          </p:nvPr>
-        </p:nvPicPr>
-        <p:blipFill>
-          <a:blip r:embed="rId3">
-            <a:extLst>
-              <a:ext uri="{28A0092B-C50C-407E-A947-70E740481C1C}">
-                <a14:useLocalDpi xmlns:a14="http://schemas.microsoft.com/office/drawing/2010/main" val="0"/>
-              </a:ext>
-            </a:extLst>
-          </a:blip>
-          <a:stretch>
-            <a:fillRect/>
-          </a:stretch>
-        </p:blipFill>
-        <p:spPr>
-          <a:xfrm>
-            <a:off x="0" y="0"/>
-            <a:ext cx="12192000" cy="6858000"/>
-          </a:xfrm>
-          <a:prstGeom prst="rect">
-            <a:avLst/>
-          </a:prstGeom>
-        </p:spPr>
-      </p:pic>
-      <p:sp useBgFill="1">
-        <p:nvSpPr>
-          <p:cNvPr id="12" name="Rectangle 11">
-            <a:extLst>
-              <a:ext uri="{FF2B5EF4-FFF2-40B4-BE49-F238E27FC236}">
-                <a16:creationId xmlns:a16="http://schemas.microsoft.com/office/drawing/2014/main" id="{EC076BC1-44A9-43BA-9FA0-93D9F5636FA2}"/>
-              </a:ext>
-              <a:ext uri="{C183D7F6-B498-43B3-948B-1728B52AA6E4}">
-                <adec:decorative xmlns:adec="http://schemas.microsoft.com/office/drawing/2017/decorative" val="1"/>
-              </a:ext>
-            </a:extLst>
-          </p:cNvPr>
-          <p:cNvSpPr>
-            <a:spLocks noGrp="1" noRot="1" noChangeAspect="1" noMove="1" noResize="1" noEditPoints="1" noAdjustHandles="1" noChangeArrowheads="1" noChangeShapeType="1" noTextEdit="1"/>
-          </p:cNvSpPr>
-          <p:nvPr>
-            <p:extLst>
-              <p:ext uri="{386F3935-93C4-4BCD-93E2-E3B085C9AB24}">
-                <p16:designElem xmlns:p16="http://schemas.microsoft.com/office/powerpoint/2015/main" val="1"/>
-              </p:ext>
-            </p:extLst>
-          </p:nvPr>
-        </p:nvSpPr>
-        <p:spPr>
-          <a:xfrm>
-            <a:off x="1" y="0"/>
-            <a:ext cx="11979952" cy="6644081"/>
-          </a:xfrm>
-          <a:prstGeom prst="rect">
-            <a:avLst/>
-          </a:prstGeom>
-          <a:ln>
-            <a:noFill/>
-          </a:ln>
-          <a:effectLst>
-            <a:outerShdw blurRad="98425" dist="76200" dir="4380000" algn="tl" rotWithShape="0">
-              <a:srgbClr val="000000">
-                <a:alpha val="68000"/>
-              </a:srgbClr>
-            </a:outerShdw>
-          </a:effectLst>
-        </p:spPr>
-        <p:style>
-          <a:lnRef idx="1">
-            <a:schemeClr val="accent1"/>
-          </a:lnRef>
-          <a:fillRef idx="3">
-            <a:schemeClr val="accent1"/>
-          </a:fillRef>
-          <a:effectRef idx="2">
-            <a:schemeClr val="accent1"/>
-          </a:effectRef>
-          <a:fontRef idx="minor">
-            <a:schemeClr val="lt1"/>
-          </a:fontRef>
-        </p:style>
-      </p:sp>
-      <p:sp>
-        <p:nvSpPr>
-          <p:cNvPr id="14" name="Freeform 9">
-            <a:extLst>
-              <a:ext uri="{FF2B5EF4-FFF2-40B4-BE49-F238E27FC236}">
-                <a16:creationId xmlns:a16="http://schemas.microsoft.com/office/drawing/2014/main" id="{10EBC408-9E16-4483-93FA-BB4E0D06D0C3}"/>
-              </a:ext>
-              <a:ext uri="{C183D7F6-B498-43B3-948B-1728B52AA6E4}">
-                <adec:decorative xmlns:adec="http://schemas.microsoft.com/office/drawing/2017/decorative" val="1"/>
-              </a:ext>
-            </a:extLst>
-          </p:cNvPr>
-          <p:cNvSpPr>
-            <a:spLocks noGrp="1" noRot="1" noChangeAspect="1" noMove="1" noResize="1" noEditPoints="1" noAdjustHandles="1" noChangeArrowheads="1" noChangeShapeType="1" noTextEdit="1"/>
-          </p:cNvSpPr>
-          <p:nvPr>
-            <p:extLst>
-              <p:ext uri="{386F3935-93C4-4BCD-93E2-E3B085C9AB24}">
-                <p16:designElem xmlns:p16="http://schemas.microsoft.com/office/powerpoint/2015/main" val="1"/>
-              </p:ext>
-            </p:extLst>
-          </p:nvPr>
-        </p:nvSpPr>
-        <p:spPr>
-          <a:xfrm>
-            <a:off x="-25397" y="0"/>
-            <a:ext cx="11773291" cy="6419514"/>
-          </a:xfrm>
-          <a:custGeom>
-            <a:avLst/>
-            <a:gdLst/>
-            <a:ahLst/>
-            <a:cxnLst/>
-            <a:rect l="l" t="t" r="r" b="b"/>
-            <a:pathLst>
-              <a:path w="11773291" h="6419514">
-                <a:moveTo>
-                  <a:pt x="11750059" y="0"/>
-                </a:moveTo>
-                <a:lnTo>
-                  <a:pt x="11773291" y="6419514"/>
-                </a:lnTo>
-                <a:lnTo>
-                  <a:pt x="0" y="6411047"/>
-                </a:lnTo>
-              </a:path>
-            </a:pathLst>
-          </a:custGeom>
-          <a:ln w="82550">
-            <a:solidFill>
-              <a:schemeClr val="tx1">
-                <a:lumMod val="50000"/>
-                <a:lumOff val="50000"/>
-              </a:schemeClr>
-            </a:solidFill>
-            <a:miter lim="800000"/>
-          </a:ln>
-        </p:spPr>
-        <p:style>
-          <a:lnRef idx="2">
-            <a:schemeClr val="accent1"/>
-          </a:lnRef>
-          <a:fillRef idx="0">
-            <a:schemeClr val="accent1"/>
-          </a:fillRef>
-          <a:effectRef idx="1">
-            <a:schemeClr val="accent1"/>
-          </a:effectRef>
-          <a:fontRef idx="minor">
-            <a:schemeClr val="tx1"/>
-          </a:fontRef>
-        </p:style>
-      </p:sp>
-      <p:sp>
-        <p:nvSpPr>
-          <p:cNvPr id="16" name="Rectangle 15">
-            <a:extLst>
-              <a:ext uri="{FF2B5EF4-FFF2-40B4-BE49-F238E27FC236}">
-                <a16:creationId xmlns:a16="http://schemas.microsoft.com/office/drawing/2014/main" id="{1DAA8918-7760-46BA-B19F-9818085CB710}"/>
-              </a:ext>
-              <a:ext uri="{C183D7F6-B498-43B3-948B-1728B52AA6E4}">
-                <adec:decorative xmlns:adec="http://schemas.microsoft.com/office/drawing/2017/decorative" val="1"/>
-              </a:ext>
-            </a:extLst>
-          </p:cNvPr>
-          <p:cNvSpPr>
-            <a:spLocks noGrp="1" noRot="1" noChangeAspect="1" noMove="1" noResize="1" noEditPoints="1" noAdjustHandles="1" noChangeArrowheads="1" noChangeShapeType="1" noTextEdit="1"/>
-          </p:cNvSpPr>
-          <p:nvPr>
-            <p:extLst>
-              <p:ext uri="{386F3935-93C4-4BCD-93E2-E3B085C9AB24}">
-                <p16:designElem xmlns:p16="http://schemas.microsoft.com/office/powerpoint/2015/main" val="1"/>
-              </p:ext>
-            </p:extLst>
-          </p:nvPr>
-        </p:nvSpPr>
-        <p:spPr bwMode="white">
-          <a:xfrm>
-            <a:off x="0" y="0"/>
-            <a:ext cx="4654296" cy="6380796"/>
-          </a:xfrm>
-          <a:prstGeom prst="rect">
-            <a:avLst/>
-          </a:prstGeom>
-          <a:gradFill flip="none" rotWithShape="1">
-            <a:gsLst>
-              <a:gs pos="34000">
-                <a:schemeClr val="accent1"/>
-              </a:gs>
-              <a:gs pos="100000">
-                <a:schemeClr val="accent1">
-                  <a:lumMod val="50000"/>
-                </a:schemeClr>
-              </a:gs>
-            </a:gsLst>
-            <a:path path="circle">
-              <a:fillToRect l="50000" t="50000" r="50000" b="50000"/>
-            </a:path>
-            <a:tileRect/>
-          </a:gradFill>
-          <a:ln>
-            <a:noFill/>
-          </a:ln>
-        </p:spPr>
-        <p:style>
-          <a:lnRef idx="1">
-            <a:schemeClr val="accent1"/>
-          </a:lnRef>
-          <a:fillRef idx="3">
-            <a:schemeClr val="accent1"/>
-          </a:fillRef>
-          <a:effectRef idx="2">
-            <a:schemeClr val="accent1"/>
-          </a:effectRef>
-          <a:fontRef idx="minor">
-            <a:schemeClr val="lt1"/>
-          </a:fontRef>
-        </p:style>
-      </p:sp>
-      <p:sp>
-        <p:nvSpPr>
-          <p:cNvPr id="2" name="Title 1">
-            <a:extLst>
-              <a:ext uri="{FF2B5EF4-FFF2-40B4-BE49-F238E27FC236}">
-                <a16:creationId xmlns:a16="http://schemas.microsoft.com/office/drawing/2014/main" id="{F01011D5-E803-D04A-9BAA-B1D023907CD1}"/>
-              </a:ext>
-            </a:extLst>
-          </p:cNvPr>
-          <p:cNvSpPr>
-            <a:spLocks noGrp="1"/>
-          </p:cNvSpPr>
-          <p:nvPr>
-            <p:ph type="title"/>
-          </p:nvPr>
-        </p:nvSpPr>
-        <p:spPr>
-          <a:xfrm>
-            <a:off x="685802" y="685800"/>
-            <a:ext cx="3381946" cy="4846967"/>
-          </a:xfrm>
-        </p:spPr>
-        <p:txBody>
-          <a:bodyPr>
-            <a:normAutofit/>
-          </a:bodyPr>
-          <a:lstStyle/>
-          <a:p>
-            <a:r>
-              <a:rPr lang="en-US" sz="4800" dirty="0">
-                <a:solidFill>
-                  <a:srgbClr val="FFFFFF"/>
-                </a:solidFill>
-              </a:rPr>
-              <a:t>LIMITATIONS</a:t>
-            </a:r>
-          </a:p>
-        </p:txBody>
-      </p:sp>
-      <p:graphicFrame>
-        <p:nvGraphicFramePr>
-          <p:cNvPr id="5" name="Content Placeholder 2">
-            <a:extLst>
-              <a:ext uri="{FF2B5EF4-FFF2-40B4-BE49-F238E27FC236}">
-                <a16:creationId xmlns:a16="http://schemas.microsoft.com/office/drawing/2014/main" id="{9A678997-6CE2-4427-A928-E779FE07A1DC}"/>
-              </a:ext>
-            </a:extLst>
-          </p:cNvPr>
-          <p:cNvGraphicFramePr>
-            <a:graphicFrameLocks noGrp="1"/>
-          </p:cNvGraphicFramePr>
-          <p:nvPr>
-            <p:ph sz="quarter" idx="13"/>
-            <p:extLst>
-              <p:ext uri="{D42A27DB-BD31-4B8C-83A1-F6EECF244321}">
-                <p14:modId xmlns:p14="http://schemas.microsoft.com/office/powerpoint/2010/main" val="416030751"/>
-              </p:ext>
-            </p:extLst>
-          </p:nvPr>
-        </p:nvGraphicFramePr>
-        <p:xfrm>
-          <a:off x="5294108" y="685800"/>
-          <a:ext cx="5759656" cy="4846967"/>
-        </p:xfrm>
-        <a:graphic>
-          <a:graphicData uri="http://schemas.openxmlformats.org/drawingml/2006/diagram">
-            <dgm:relIds xmlns:dgm="http://schemas.openxmlformats.org/drawingml/2006/diagram" xmlns:r="http://schemas.openxmlformats.org/officeDocument/2006/relationships" r:dm="rId4" r:lo="rId5" r:qs="rId6" r:cs="rId7"/>
-          </a:graphicData>
-        </a:graphic>
-      </p:graphicFrame>
-    </p:spTree>
-    <p:extLst>
-      <p:ext uri="{BB962C8B-B14F-4D97-AF65-F5344CB8AC3E}">
-        <p14:creationId xmlns:p14="http://schemas.microsoft.com/office/powerpoint/2010/main" val="1803381748"/>
-      </p:ext>
-    </p:extLst>
-  </p:cSld>
-  <p:clrMapOvr>
-    <a:masterClrMapping/>
-  </p:clrMapOvr>
-</p:sld>
-</file>
-
-<file path=ppt/slides/slide7.xml><?xml version="1.0" encoding="utf-8"?>
-<p:sld xmlns:a="http://schemas.openxmlformats.org/drawingml/2006/main" xmlns:r="http://schemas.openxmlformats.org/officeDocument/2006/relationships" xmlns:p="http://schemas.openxmlformats.org/presentationml/2006/main">
-  <p:cSld>
-    <p:bg>
-      <p:bgPr>
-        <a:blipFill>
-          <a:blip r:embed="rId2">
-            <a:duotone>
-              <a:schemeClr val="bg1">
-                <a:shade val="48000"/>
-                <a:satMod val="110000"/>
-                <a:lumMod val="40000"/>
-              </a:schemeClr>
-              <a:schemeClr val="bg1">
-                <a:tint val="90000"/>
-                <a:lumMod val="106000"/>
-              </a:schemeClr>
-            </a:duotone>
-          </a:blip>
-          <a:stretch/>
-        </a:blipFill>
-        <a:effectLst/>
-      </p:bgPr>
-    </p:bg>
-    <p:spTree>
-      <p:nvGrpSpPr>
-        <p:cNvPr id="1" name=""/>
-        <p:cNvGrpSpPr/>
-        <p:nvPr/>
-      </p:nvGrpSpPr>
-      <p:grpSpPr>
-        <a:xfrm>
-          <a:off x="0" y="0"/>
-          <a:ext cx="0" cy="0"/>
-          <a:chOff x="0" y="0"/>
-          <a:chExt cx="0" cy="0"/>
-        </a:xfrm>
-      </p:grpSpPr>
-      <p:pic>
-        <p:nvPicPr>
-          <p:cNvPr id="5" name="Picture 4" descr="A picture containing text, green, beverage, painted&#10;&#10;Description automatically generated">
-            <a:extLst>
-              <a:ext uri="{FF2B5EF4-FFF2-40B4-BE49-F238E27FC236}">
-                <a16:creationId xmlns:a16="http://schemas.microsoft.com/office/drawing/2014/main" id="{1078F5CD-E953-B747-B315-B09CADD402CF}"/>
-              </a:ext>
-            </a:extLst>
-          </p:cNvPr>
-          <p:cNvPicPr>
-            <a:picLocks noChangeAspect="1"/>
-          </p:cNvPicPr>
-          <p:nvPr/>
-        </p:nvPicPr>
-        <p:blipFill>
-          <a:blip r:embed="rId3">
-            <a:extLst>
-              <a:ext uri="{837473B0-CC2E-450A-ABE3-18F120FF3D39}">
-                <a1611:picAttrSrcUrl xmlns:a1611="http://schemas.microsoft.com/office/drawing/2016/11/main" r:id="rId4"/>
-              </a:ext>
-            </a:extLst>
-          </a:blip>
-          <a:stretch>
-            <a:fillRect/>
-          </a:stretch>
-        </p:blipFill>
-        <p:spPr>
-          <a:xfrm>
-            <a:off x="6562455" y="1701137"/>
-            <a:ext cx="4677405" cy="2993539"/>
-          </a:xfrm>
-          <a:prstGeom prst="rect">
-            <a:avLst/>
-          </a:prstGeom>
-          <a:ln>
-            <a:noFill/>
-          </a:ln>
-        </p:spPr>
-      </p:pic>
-      <p:sp>
-        <p:nvSpPr>
-          <p:cNvPr id="2" name="Title 1">
-            <a:extLst>
-              <a:ext uri="{FF2B5EF4-FFF2-40B4-BE49-F238E27FC236}">
-                <a16:creationId xmlns:a16="http://schemas.microsoft.com/office/drawing/2014/main" id="{64B1EACD-B8B4-DB43-A18A-FB3A0EF01670}"/>
-              </a:ext>
-            </a:extLst>
-          </p:cNvPr>
-          <p:cNvSpPr>
-            <a:spLocks noGrp="1"/>
-          </p:cNvSpPr>
-          <p:nvPr>
-            <p:ph type="title"/>
-          </p:nvPr>
-        </p:nvSpPr>
-        <p:spPr>
-          <a:xfrm>
-            <a:off x="685799" y="690479"/>
-            <a:ext cx="4957275" cy="1146825"/>
-          </a:xfrm>
-        </p:spPr>
-        <p:txBody>
-          <a:bodyPr>
-            <a:normAutofit/>
-          </a:bodyPr>
-          <a:lstStyle/>
-          <a:p>
-            <a:r>
-              <a:rPr lang="en-US" sz="3700" dirty="0">
-                <a:solidFill>
-                  <a:schemeClr val="accent1">
-                    <a:lumMod val="75000"/>
-                  </a:schemeClr>
-                </a:solidFill>
-              </a:rPr>
-              <a:t>FURTHER RESEARCH</a:t>
-            </a:r>
-          </a:p>
-        </p:txBody>
-      </p:sp>
-      <p:sp>
-        <p:nvSpPr>
-          <p:cNvPr id="3" name="Content Placeholder 2">
-            <a:extLst>
-              <a:ext uri="{FF2B5EF4-FFF2-40B4-BE49-F238E27FC236}">
-                <a16:creationId xmlns:a16="http://schemas.microsoft.com/office/drawing/2014/main" id="{B82A9D01-F067-0841-9CA2-16B60BACC40D}"/>
-              </a:ext>
-            </a:extLst>
-          </p:cNvPr>
-          <p:cNvSpPr>
-            <a:spLocks noGrp="1"/>
-          </p:cNvSpPr>
-          <p:nvPr>
-            <p:ph sz="quarter" idx="13"/>
-          </p:nvPr>
-        </p:nvSpPr>
-        <p:spPr>
-          <a:xfrm>
-            <a:off x="685800" y="2063395"/>
-            <a:ext cx="4957273" cy="3446103"/>
-          </a:xfrm>
-        </p:spPr>
-        <p:txBody>
-          <a:bodyPr>
-            <a:normAutofit/>
-          </a:bodyPr>
-          <a:lstStyle/>
-          <a:p>
-            <a:r>
-              <a:rPr lang="en-US" sz="1800" dirty="0">
-                <a:latin typeface="Calibri" panose="020F0502020204030204" pitchFamily="34" charset="0"/>
-                <a:cs typeface="Calibri" panose="020F0502020204030204" pitchFamily="34" charset="0"/>
-              </a:rPr>
-              <a:t>Mention how we can take our findings forward (particularly if we have plan for continuing with this data for the final project)</a:t>
-            </a:r>
-          </a:p>
-        </p:txBody>
-      </p:sp>
-      <p:sp>
-        <p:nvSpPr>
-          <p:cNvPr id="6" name="TextBox 5">
-            <a:extLst>
-              <a:ext uri="{FF2B5EF4-FFF2-40B4-BE49-F238E27FC236}">
-                <a16:creationId xmlns:a16="http://schemas.microsoft.com/office/drawing/2014/main" id="{9E854D90-7FB8-1740-B173-CEB26C78B799}"/>
-              </a:ext>
-            </a:extLst>
-          </p:cNvPr>
-          <p:cNvSpPr txBox="1"/>
-          <p:nvPr/>
-        </p:nvSpPr>
-        <p:spPr>
-          <a:xfrm>
-            <a:off x="9081898" y="4494621"/>
-            <a:ext cx="2157962" cy="200055"/>
-          </a:xfrm>
-          <a:prstGeom prst="rect">
-            <a:avLst/>
-          </a:prstGeom>
-          <a:solidFill>
-            <a:srgbClr val="000000"/>
-          </a:solidFill>
-        </p:spPr>
-        <p:txBody>
-          <a:bodyPr wrap="none" rtlCol="0">
-            <a:spAutoFit/>
-          </a:bodyPr>
-          <a:lstStyle/>
-          <a:p>
-            <a:pPr algn="r">
-              <a:spcAft>
-                <a:spcPts val="600"/>
-              </a:spcAft>
-            </a:pPr>
-            <a:r>
-              <a:rPr lang="en-US" sz="700">
-                <a:solidFill>
-                  <a:srgbClr val="FFFFFF"/>
-                </a:solidFill>
-                <a:hlinkClick r:id="rId4" tooltip="http://www.sagaciousnewsnetwork.com/child-narcissistic-parent-my-needs/">
-                  <a:extLst>
-                    <a:ext uri="{A12FA001-AC4F-418D-AE19-62706E023703}">
-                      <ahyp:hlinkClr xmlns:ahyp="http://schemas.microsoft.com/office/drawing/2018/hyperlinkcolor" val="tx"/>
-                    </a:ext>
-                  </a:extLst>
-                </a:hlinkClick>
-              </a:rPr>
-              <a:t>This Photo</a:t>
-            </a:r>
-            <a:r>
-              <a:rPr lang="en-US" sz="700">
-                <a:solidFill>
-                  <a:srgbClr val="FFFFFF"/>
-                </a:solidFill>
-              </a:rPr>
-              <a:t> by Unknown Author is licensed under </a:t>
-            </a:r>
-            <a:r>
-              <a:rPr lang="en-US" sz="700">
-                <a:solidFill>
-                  <a:srgbClr val="FFFFFF"/>
-                </a:solidFill>
-                <a:hlinkClick r:id="rId5" tooltip="https://creativecommons.org/licenses/by/3.0/">
-                  <a:extLst>
-                    <a:ext uri="{A12FA001-AC4F-418D-AE19-62706E023703}">
-                      <ahyp:hlinkClr xmlns:ahyp="http://schemas.microsoft.com/office/drawing/2018/hyperlinkcolor" val="tx"/>
-                    </a:ext>
-                  </a:extLst>
-                </a:hlinkClick>
-              </a:rPr>
-              <a:t>CC BY</a:t>
-            </a:r>
-            <a:endParaRPr lang="en-US" sz="700">
-              <a:solidFill>
-                <a:srgbClr val="FFFFFF"/>
-              </a:solidFill>
-            </a:endParaRPr>
-          </a:p>
-        </p:txBody>
-      </p:sp>
-    </p:spTree>
-    <p:extLst>
-      <p:ext uri="{BB962C8B-B14F-4D97-AF65-F5344CB8AC3E}">
-        <p14:creationId xmlns:p14="http://schemas.microsoft.com/office/powerpoint/2010/main" val="3216832741"/>
-      </p:ext>
-    </p:extLst>
-  </p:cSld>
-  <p:clrMapOvr>
-    <a:masterClrMapping/>
-  </p:clrMapOvr>
-</p:sld>
-</file>
-
-<file path=ppt/slides/slide8.xml><?xml version="1.0" encoding="utf-8"?>
-<p:sld xmlns:a="http://schemas.openxmlformats.org/drawingml/2006/main" xmlns:r="http://schemas.openxmlformats.org/officeDocument/2006/relationships" xmlns:p="http://schemas.openxmlformats.org/presentationml/2006/main">
-  <p:cSld>
-    <p:bg>
-      <p:bgPr>
-        <a:blipFill>
-          <a:blip r:embed="rId2">
-            <a:duotone>
-              <a:schemeClr val="bg1">
-                <a:shade val="48000"/>
-                <a:satMod val="110000"/>
-                <a:lumMod val="40000"/>
-              </a:schemeClr>
-              <a:schemeClr val="bg1">
-                <a:tint val="90000"/>
-                <a:lumMod val="106000"/>
-              </a:schemeClr>
-            </a:duotone>
-          </a:blip>
-          <a:stretch/>
-        </a:blipFill>
-        <a:effectLst/>
-      </p:bgPr>
-    </p:bg>
-    <p:spTree>
-      <p:nvGrpSpPr>
-        <p:cNvPr id="1" name=""/>
-        <p:cNvGrpSpPr/>
-        <p:nvPr/>
-      </p:nvGrpSpPr>
-      <p:grpSpPr>
-        <a:xfrm>
-          <a:off x="0" y="0"/>
-          <a:ext cx="0" cy="0"/>
-          <a:chOff x="0" y="0"/>
-          <a:chExt cx="0" cy="0"/>
-        </a:xfrm>
-      </p:grpSpPr>
-      <p:sp>
-        <p:nvSpPr>
-          <p:cNvPr id="2" name="Title 1">
-            <a:extLst>
-              <a:ext uri="{FF2B5EF4-FFF2-40B4-BE49-F238E27FC236}">
-                <a16:creationId xmlns:a16="http://schemas.microsoft.com/office/drawing/2014/main" id="{EBBD4232-D5D6-184B-B8EB-6439D502D204}"/>
-              </a:ext>
-            </a:extLst>
-          </p:cNvPr>
-          <p:cNvSpPr>
-            <a:spLocks noGrp="1"/>
-          </p:cNvSpPr>
-          <p:nvPr>
-            <p:ph type="title"/>
-          </p:nvPr>
-        </p:nvSpPr>
-        <p:spPr>
-          <a:xfrm>
-            <a:off x="446663" y="1304458"/>
-            <a:ext cx="3326650" cy="2901781"/>
-          </a:xfrm>
-        </p:spPr>
-        <p:txBody>
-          <a:bodyPr vert="horz" lIns="91440" tIns="45720" rIns="91440" bIns="45720" rtlCol="0" anchor="b">
-            <a:normAutofit/>
-          </a:bodyPr>
-          <a:lstStyle/>
-          <a:p>
-            <a:pPr algn="r"/>
-            <a:r>
-              <a:rPr lang="en-US" sz="4800" dirty="0"/>
-              <a:t>COMMENTS /</a:t>
-            </a:r>
-            <a:br>
-              <a:rPr lang="en-US" sz="4800" dirty="0"/>
-            </a:br>
-            <a:r>
-              <a:rPr lang="en-US" sz="4800" dirty="0"/>
-              <a:t> QUESTIONS?</a:t>
-            </a:r>
-          </a:p>
-        </p:txBody>
-      </p:sp>
-      <p:pic>
-        <p:nvPicPr>
-          <p:cNvPr id="5" name="Content Placeholder 4" descr="Text&#10;&#10;Description automatically generated">
-            <a:extLst>
-              <a:ext uri="{FF2B5EF4-FFF2-40B4-BE49-F238E27FC236}">
-                <a16:creationId xmlns:a16="http://schemas.microsoft.com/office/drawing/2014/main" id="{9A9228A2-BF7E-8B4A-AD58-F4A3A0F95581}"/>
-              </a:ext>
-            </a:extLst>
-          </p:cNvPr>
-          <p:cNvPicPr>
-            <a:picLocks noGrp="1" noChangeAspect="1"/>
-          </p:cNvPicPr>
-          <p:nvPr>
-            <p:ph sz="quarter" idx="13"/>
-          </p:nvPr>
-        </p:nvPicPr>
-        <p:blipFill>
-          <a:blip r:embed="rId3">
-            <a:extLst>
-              <a:ext uri="{837473B0-CC2E-450A-ABE3-18F120FF3D39}">
-                <a1611:picAttrSrcUrl xmlns:a1611="http://schemas.microsoft.com/office/drawing/2016/11/main" r:id="rId4"/>
-              </a:ext>
-            </a:extLst>
-          </a:blip>
-          <a:stretch>
-            <a:fillRect/>
-          </a:stretch>
-        </p:blipFill>
-        <p:spPr>
-          <a:xfrm>
-            <a:off x="5321367" y="1758820"/>
-            <a:ext cx="6174771" cy="3334376"/>
-          </a:xfrm>
-          <a:prstGeom prst="rect">
-            <a:avLst/>
-          </a:prstGeom>
-        </p:spPr>
-      </p:pic>
-      <p:sp>
-        <p:nvSpPr>
-          <p:cNvPr id="6" name="TextBox 5">
-            <a:extLst>
-              <a:ext uri="{FF2B5EF4-FFF2-40B4-BE49-F238E27FC236}">
-                <a16:creationId xmlns:a16="http://schemas.microsoft.com/office/drawing/2014/main" id="{A054DB01-79B7-A44D-A0B1-8096CC3EAD51}"/>
-              </a:ext>
-            </a:extLst>
-          </p:cNvPr>
-          <p:cNvSpPr txBox="1"/>
-          <p:nvPr/>
-        </p:nvSpPr>
-        <p:spPr>
-          <a:xfrm>
-            <a:off x="9221156" y="4893141"/>
-            <a:ext cx="2274982" cy="200055"/>
-          </a:xfrm>
-          <a:prstGeom prst="rect">
-            <a:avLst/>
-          </a:prstGeom>
-          <a:solidFill>
-            <a:srgbClr val="000000"/>
-          </a:solidFill>
-        </p:spPr>
-        <p:txBody>
-          <a:bodyPr wrap="none" rtlCol="0">
-            <a:spAutoFit/>
-          </a:bodyPr>
-          <a:lstStyle/>
-          <a:p>
-            <a:pPr algn="r">
-              <a:spcAft>
-                <a:spcPts val="600"/>
-              </a:spcAft>
-            </a:pPr>
-            <a:r>
-              <a:rPr lang="en-US" sz="700">
-                <a:solidFill>
-                  <a:srgbClr val="FFFFFF"/>
-                </a:solidFill>
-                <a:hlinkClick r:id="rId4" tooltip="https://commons.wikimedia.org/wiki/File:Thank-you-word-cloud.jpg">
-                  <a:extLst>
-                    <a:ext uri="{A12FA001-AC4F-418D-AE19-62706E023703}">
-                      <ahyp:hlinkClr xmlns:ahyp="http://schemas.microsoft.com/office/drawing/2018/hyperlinkcolor" val="tx"/>
-                    </a:ext>
-                  </a:extLst>
-                </a:hlinkClick>
-              </a:rPr>
-              <a:t>This Photo</a:t>
-            </a:r>
-            <a:r>
-              <a:rPr lang="en-US" sz="700">
-                <a:solidFill>
-                  <a:srgbClr val="FFFFFF"/>
-                </a:solidFill>
-              </a:rPr>
-              <a:t> by Unknown Author is licensed under </a:t>
-            </a:r>
-            <a:r>
-              <a:rPr lang="en-US" sz="700">
-                <a:solidFill>
-                  <a:srgbClr val="FFFFFF"/>
-                </a:solidFill>
-                <a:hlinkClick r:id="rId5" tooltip="https://creativecommons.org/licenses/by-sa/3.0/">
-                  <a:extLst>
-                    <a:ext uri="{A12FA001-AC4F-418D-AE19-62706E023703}">
-                      <ahyp:hlinkClr xmlns:ahyp="http://schemas.microsoft.com/office/drawing/2018/hyperlinkcolor" val="tx"/>
-                    </a:ext>
-                  </a:extLst>
-                </a:hlinkClick>
-              </a:rPr>
-              <a:t>CC BY-SA</a:t>
-            </a:r>
-            <a:endParaRPr lang="en-US" sz="700">
-              <a:solidFill>
-                <a:srgbClr val="FFFFFF"/>
-              </a:solidFill>
-            </a:endParaRPr>
-          </a:p>
-        </p:txBody>
-      </p:sp>
-    </p:spTree>
-    <p:extLst>
-      <p:ext uri="{BB962C8B-B14F-4D97-AF65-F5344CB8AC3E}">
-        <p14:creationId xmlns:p14="http://schemas.microsoft.com/office/powerpoint/2010/main" val="909605127"/>
-      </p:ext>
-    </p:extLst>
-  </p:cSld>
-  <p:clrMapOvr>
-    <a:masterClrMapping/>
-  </p:clrMapOvr>
 </p:sld>
 </file>
 

</xml_diff>